<commit_message>
Update presskit explainer deck
</commit_message>
<xml_diff>
--- a/static/presskit/qrl.pptx
+++ b/static/presskit/qrl.pptx
@@ -16,21 +16,22 @@
     <p:sldId id="261" r:id="rId11"/>
     <p:sldId id="262" r:id="rId12"/>
     <p:sldId id="263" r:id="rId13"/>
+    <p:sldId id="264" r:id="rId14"/>
   </p:sldIdLst>
   <p:sldSz cy="5143500" cx="9144000"/>
   <p:notesSz cx="6858000" cy="9144000"/>
   <p:embeddedFontLst>
     <p:embeddedFont>
       <p:font typeface="Ropa Sans"/>
-      <p:regular r:id="rId14"/>
-      <p:italic r:id="rId15"/>
+      <p:regular r:id="rId15"/>
+      <p:italic r:id="rId16"/>
     </p:embeddedFont>
     <p:embeddedFont>
       <p:font typeface="Source Sans Pro"/>
-      <p:regular r:id="rId16"/>
-      <p:bold r:id="rId17"/>
-      <p:italic r:id="rId18"/>
-      <p:boldItalic r:id="rId19"/>
+      <p:regular r:id="rId17"/>
+      <p:bold r:id="rId18"/>
+      <p:italic r:id="rId19"/>
+      <p:boldItalic r:id="rId20"/>
     </p:embeddedFont>
   </p:embeddedFontLst>
   <p:defaultTextStyle>
@@ -265,7 +266,7 @@
   <p:extLst>
     <p:ext uri="{EFAFB233-063F-42B5-8137-9DF3F51BA10A}">
       <p15:sldGuideLst>
-        <p15:guide id="1" orient="horz" pos="432">
+        <p15:guide id="1" orient="horz" pos="448">
           <p15:clr>
             <a:srgbClr val="A4A3A4"/>
           </p15:clr>
@@ -290,7 +291,7 @@
             <a:srgbClr val="9AA0A6"/>
           </p15:clr>
         </p15:guide>
-        <p15:guide id="6" orient="horz" pos="1562">
+        <p15:guide id="6" orient="horz" pos="1748">
           <p15:clr>
             <a:srgbClr val="9AA0A6"/>
           </p15:clr>
@@ -1054,7 +1055,7 @@
   <p:cSld>
     <p:spTree>
       <p:nvGrpSpPr>
-        <p:cNvPr id="89" name="Shape 89"/>
+        <p:cNvPr id="90" name="Shape 90"/>
         <p:cNvGrpSpPr/>
         <p:nvPr/>
       </p:nvGrpSpPr>
@@ -1068,7 +1069,7 @@
       </p:grpSpPr>
       <p:sp>
         <p:nvSpPr>
-          <p:cNvPr id="90" name="Google Shape;90;g11e14d80b30_0_6:notes"/>
+          <p:cNvPr id="91" name="Google Shape;91;g11e14d80b30_0_6:notes"/>
           <p:cNvSpPr/>
           <p:nvPr>
             <p:ph idx="2" type="sldImg"/>
@@ -1113,7 +1114,7 @@
       </p:sp>
       <p:sp>
         <p:nvSpPr>
-          <p:cNvPr id="91" name="Google Shape;91;g11e14d80b30_0_6:notes"/>
+          <p:cNvPr id="92" name="Google Shape;92;g11e14d80b30_0_6:notes"/>
           <p:cNvSpPr txBox="1"/>
           <p:nvPr>
             <p:ph idx="1" type="body"/>
@@ -1156,7 +1157,7 @@
       </p:sp>
       <p:sp>
         <p:nvSpPr>
-          <p:cNvPr id="92" name="Google Shape;92;g11e14d80b30_0_6:notes"/>
+          <p:cNvPr id="93" name="Google Shape;93;g11e14d80b30_0_6:notes"/>
           <p:cNvSpPr txBox="1"/>
           <p:nvPr>
             <p:ph idx="12" type="sldNum"/>
@@ -1211,7 +1212,7 @@
   <p:cSld>
     <p:spTree>
       <p:nvGrpSpPr>
-        <p:cNvPr id="100" name="Shape 100"/>
+        <p:cNvPr id="101" name="Shape 101"/>
         <p:cNvGrpSpPr/>
         <p:nvPr/>
       </p:nvGrpSpPr>
@@ -1225,7 +1226,7 @@
       </p:grpSpPr>
       <p:sp>
         <p:nvSpPr>
-          <p:cNvPr id="101" name="Google Shape;101;gf3b59af632_0_38:notes"/>
+          <p:cNvPr id="102" name="Google Shape;102;gf3b59af632_0_38:notes"/>
           <p:cNvSpPr/>
           <p:nvPr>
             <p:ph idx="2" type="sldImg"/>
@@ -1270,7 +1271,7 @@
       </p:sp>
       <p:sp>
         <p:nvSpPr>
-          <p:cNvPr id="102" name="Google Shape;102;gf3b59af632_0_38:notes"/>
+          <p:cNvPr id="103" name="Google Shape;103;gf3b59af632_0_38:notes"/>
           <p:cNvSpPr txBox="1"/>
           <p:nvPr>
             <p:ph idx="1" type="body"/>
@@ -1320,7 +1321,7 @@
       </p:sp>
       <p:sp>
         <p:nvSpPr>
-          <p:cNvPr id="103" name="Google Shape;103;gf3b59af632_0_38:notes"/>
+          <p:cNvPr id="104" name="Google Shape;104;gf3b59af632_0_38:notes"/>
           <p:cNvSpPr txBox="1"/>
           <p:nvPr>
             <p:ph idx="12" type="sldNum"/>
@@ -1833,6 +1834,163 @@
       <p:sp>
         <p:nvSpPr>
           <p:cNvPr id="148" name="Google Shape;148;g11e37867359_1_3:notes"/>
+          <p:cNvSpPr txBox="1"/>
+          <p:nvPr>
+            <p:ph idx="12" type="sldNum"/>
+          </p:nvPr>
+        </p:nvSpPr>
+        <p:spPr>
+          <a:xfrm>
+            <a:off x="3884613" y="8685213"/>
+            <a:ext cx="2971800" cy="458700"/>
+          </a:xfrm>
+          <a:prstGeom prst="rect">
+            <a:avLst/>
+          </a:prstGeom>
+          <a:noFill/>
+          <a:ln>
+            <a:noFill/>
+          </a:ln>
+        </p:spPr>
+        <p:txBody>
+          <a:bodyPr anchorCtr="0" anchor="b" bIns="45700" lIns="91425" spcFirstLastPara="1" rIns="91425" wrap="square" tIns="45700">
+            <a:noAutofit/>
+          </a:bodyPr>
+          <a:lstStyle/>
+          <a:p>
+            <a:pPr indent="0" lvl="0" marL="0" rtl="0" algn="r">
+              <a:spcBef>
+                <a:spcPts val="0"/>
+              </a:spcBef>
+              <a:spcAft>
+                <a:spcPts val="0"/>
+              </a:spcAft>
+              <a:buNone/>
+            </a:pPr>
+            <a:fld id="{00000000-1234-1234-1234-123412341234}" type="slidenum">
+              <a:rPr lang="en"/>
+              <a:t>‹#›</a:t>
+            </a:fld>
+            <a:endParaRPr/>
+          </a:p>
+        </p:txBody>
+      </p:sp>
+    </p:spTree>
+  </p:cSld>
+  <p:clrMapOvr>
+    <a:masterClrMapping/>
+  </p:clrMapOvr>
+</p:notes>
+</file>
+
+<file path=ppt/notesSlides/notesSlide9.xml><?xml version="1.0" encoding="utf-8"?>
+<p:notes xmlns:a="http://schemas.openxmlformats.org/drawingml/2006/main" xmlns:r="http://schemas.openxmlformats.org/officeDocument/2006/relationships" xmlns:mc="http://schemas.openxmlformats.org/markup-compatibility/2006" xmlns:mv="urn:schemas-microsoft-com:mac:vml" xmlns:p="http://schemas.openxmlformats.org/presentationml/2006/main" xmlns:c="http://schemas.openxmlformats.org/drawingml/2006/chart" xmlns:dgm="http://schemas.openxmlformats.org/drawingml/2006/diagram" xmlns:o="urn:schemas-microsoft-com:office:office" xmlns:v="urn:schemas-microsoft-com:vml" xmlns:pvml="urn:schemas-microsoft-com:office:powerpoint" xmlns:com="http://schemas.openxmlformats.org/drawingml/2006/compatibility" xmlns:p14="http://schemas.microsoft.com/office/powerpoint/2010/main" xmlns:p15="http://schemas.microsoft.com/office/powerpoint/2012/main" xmlns:ahyp="http://schemas.microsoft.com/office/drawing/2018/hyperlinkcolor" showMasterPhAnim="0" showMasterSp="0">
+  <p:cSld>
+    <p:spTree>
+      <p:nvGrpSpPr>
+        <p:cNvPr id="156" name="Shape 156"/>
+        <p:cNvGrpSpPr/>
+        <p:nvPr/>
+      </p:nvGrpSpPr>
+      <p:grpSpPr>
+        <a:xfrm>
+          <a:off x="0" y="0"/>
+          <a:ext cx="0" cy="0"/>
+          <a:chOff x="0" y="0"/>
+          <a:chExt cx="0" cy="0"/>
+        </a:xfrm>
+      </p:grpSpPr>
+      <p:sp>
+        <p:nvSpPr>
+          <p:cNvPr id="157" name="Google Shape;157;g11eb73b3586_0_7:notes"/>
+          <p:cNvSpPr/>
+          <p:nvPr>
+            <p:ph idx="2" type="sldImg"/>
+          </p:nvPr>
+        </p:nvSpPr>
+        <p:spPr>
+          <a:xfrm>
+            <a:off x="685800" y="1143000"/>
+            <a:ext cx="5486400" cy="3086100"/>
+          </a:xfrm>
+          <a:custGeom>
+            <a:rect b="b" l="l" r="r" t="t"/>
+            <a:pathLst>
+              <a:path extrusionOk="0" h="120000" w="120000">
+                <a:moveTo>
+                  <a:pt x="0" y="0"/>
+                </a:moveTo>
+                <a:lnTo>
+                  <a:pt x="120000" y="0"/>
+                </a:lnTo>
+                <a:lnTo>
+                  <a:pt x="120000" y="120000"/>
+                </a:lnTo>
+                <a:lnTo>
+                  <a:pt x="0" y="120000"/>
+                </a:lnTo>
+                <a:close/>
+              </a:path>
+            </a:pathLst>
+          </a:custGeom>
+          <a:noFill/>
+          <a:ln cap="flat" cmpd="sng" w="12700">
+            <a:solidFill>
+              <a:srgbClr val="000000"/>
+            </a:solidFill>
+            <a:prstDash val="solid"/>
+            <a:round/>
+            <a:headEnd len="sm" w="sm" type="none"/>
+            <a:tailEnd len="sm" w="sm" type="none"/>
+          </a:ln>
+        </p:spPr>
+      </p:sp>
+      <p:sp>
+        <p:nvSpPr>
+          <p:cNvPr id="158" name="Google Shape;158;g11eb73b3586_0_7:notes"/>
+          <p:cNvSpPr txBox="1"/>
+          <p:nvPr>
+            <p:ph idx="1" type="body"/>
+          </p:nvPr>
+        </p:nvSpPr>
+        <p:spPr>
+          <a:xfrm>
+            <a:off x="685800" y="4400550"/>
+            <a:ext cx="5486400" cy="3600600"/>
+          </a:xfrm>
+          <a:prstGeom prst="rect">
+            <a:avLst/>
+          </a:prstGeom>
+          <a:noFill/>
+          <a:ln>
+            <a:noFill/>
+          </a:ln>
+        </p:spPr>
+        <p:txBody>
+          <a:bodyPr anchorCtr="0" anchor="t" bIns="45700" lIns="91425" spcFirstLastPara="1" rIns="91425" wrap="square" tIns="45700">
+            <a:noAutofit/>
+          </a:bodyPr>
+          <a:lstStyle/>
+          <a:p>
+            <a:pPr indent="0" lvl="0" marL="0" rtl="0" algn="l">
+              <a:spcBef>
+                <a:spcPts val="0"/>
+              </a:spcBef>
+              <a:spcAft>
+                <a:spcPts val="0"/>
+              </a:spcAft>
+              <a:buNone/>
+            </a:pPr>
+            <a:r>
+              <a:t/>
+            </a:r>
+            <a:endParaRPr/>
+          </a:p>
+        </p:txBody>
+      </p:sp>
+      <p:sp>
+        <p:nvSpPr>
+          <p:cNvPr id="159" name="Google Shape;159;g11eb73b3586_0_7:notes"/>
           <p:cNvSpPr txBox="1"/>
           <p:nvPr>
             <p:ph idx="12" type="sldNum"/>
@@ -11187,7 +11345,7 @@
             </a:pPr>
             <a:r>
               <a:rPr lang="en"/>
-              <a:t>Visionary blockchain and digital asset security</a:t>
+              <a:t>Visionary Blockchain and Digital Asset Security</a:t>
             </a:r>
             <a:endParaRPr/>
           </a:p>
@@ -11228,7 +11386,7 @@
         </p:nvSpPr>
         <p:spPr>
           <a:xfrm>
-            <a:off x="1143000" y="1187630"/>
+            <a:off x="1143000" y="137305"/>
             <a:ext cx="6858000" cy="699000"/>
           </a:xfrm>
           <a:prstGeom prst="rect">
@@ -11325,7 +11483,11 @@
             </a:pPr>
             <a:r>
               <a:rPr lang="en"/>
-              <a:t>A purpose built, industrial-grade, provably secure quantum computer resistant cryptocurrency.</a:t>
+              <a:t>A purpose built, industrial-grade, provably secure quantum computer resistant cryptocurrency running </a:t>
+            </a:r>
+            <a:r>
+              <a:rPr lang="en"/>
+              <a:t>since 2018.</a:t>
             </a:r>
             <a:endParaRPr/>
           </a:p>
@@ -11341,7 +11503,7 @@
         </p:nvSpPr>
         <p:spPr>
           <a:xfrm>
-            <a:off x="1143000" y="1798630"/>
+            <a:off x="1143000" y="805205"/>
             <a:ext cx="6858000" cy="431400"/>
           </a:xfrm>
           <a:prstGeom prst="rect">
@@ -11382,6 +11544,68 @@
           </a:p>
         </p:txBody>
       </p:sp>
+      <p:sp>
+        <p:nvSpPr>
+          <p:cNvPr id="89" name="Google Shape;89;p14"/>
+          <p:cNvSpPr txBox="1"/>
+          <p:nvPr>
+            <p:ph type="ctrTitle"/>
+          </p:nvPr>
+        </p:nvSpPr>
+        <p:spPr>
+          <a:xfrm>
+            <a:off x="1029125" y="1780530"/>
+            <a:ext cx="6858000" cy="699000"/>
+          </a:xfrm>
+          <a:prstGeom prst="rect">
+            <a:avLst/>
+          </a:prstGeom>
+          <a:noFill/>
+          <a:ln>
+            <a:noFill/>
+          </a:ln>
+        </p:spPr>
+        <p:txBody>
+          <a:bodyPr anchorCtr="0" anchor="b" bIns="34275" lIns="68575" spcFirstLastPara="1" rIns="68575" wrap="square" tIns="34275">
+            <a:normAutofit/>
+          </a:bodyPr>
+          <a:lstStyle/>
+          <a:p>
+            <a:pPr indent="0" lvl="0" marL="0" rtl="0" algn="ctr">
+              <a:lnSpc>
+                <a:spcPct val="90000"/>
+              </a:lnSpc>
+              <a:spcBef>
+                <a:spcPts val="0"/>
+              </a:spcBef>
+              <a:spcAft>
+                <a:spcPts val="0"/>
+              </a:spcAft>
+              <a:buClr>
+                <a:schemeClr val="accent1"/>
+              </a:buClr>
+              <a:buSzPts val="4100"/>
+              <a:buFont typeface="Arial"/>
+              <a:buNone/>
+            </a:pPr>
+            <a:r>
+              <a:rPr lang="en" sz="4100">
+                <a:latin typeface="Ropa Sans"/>
+                <a:ea typeface="Ropa Sans"/>
+                <a:cs typeface="Ropa Sans"/>
+                <a:sym typeface="Ropa Sans"/>
+              </a:rPr>
+              <a:t>What is the QRL?</a:t>
+            </a:r>
+            <a:endParaRPr b="1">
+              <a:latin typeface="Ropa Sans"/>
+              <a:ea typeface="Ropa Sans"/>
+              <a:cs typeface="Ropa Sans"/>
+              <a:sym typeface="Ropa Sans"/>
+            </a:endParaRPr>
+          </a:p>
+        </p:txBody>
+      </p:sp>
     </p:spTree>
   </p:cSld>
   <p:clrMapOvr>
@@ -11395,7 +11619,7 @@
   <p:cSld>
     <p:spTree>
       <p:nvGrpSpPr>
-        <p:cNvPr id="93" name="Shape 93"/>
+        <p:cNvPr id="94" name="Shape 94"/>
         <p:cNvGrpSpPr/>
         <p:nvPr/>
       </p:nvGrpSpPr>
@@ -11409,7 +11633,7 @@
       </p:grpSpPr>
       <p:sp>
         <p:nvSpPr>
-          <p:cNvPr id="94" name="Google Shape;94;p15"/>
+          <p:cNvPr id="95" name="Google Shape;95;p15"/>
           <p:cNvSpPr txBox="1"/>
           <p:nvPr>
             <p:ph type="title"/>
@@ -11471,7 +11695,7 @@
       </p:sp>
       <p:pic>
         <p:nvPicPr>
-          <p:cNvPr id="95" name="Google Shape;95;p15"/>
+          <p:cNvPr id="96" name="Google Shape;96;p15"/>
           <p:cNvPicPr preferRelativeResize="0"/>
           <p:nvPr/>
         </p:nvPicPr>
@@ -11479,13 +11703,13 @@
           <a:blip r:embed="rId3">
             <a:alphaModFix/>
           </a:blip>
-          <a:srcRect b="20737" l="1578" r="1569" t="21173"/>
+          <a:srcRect b="20577" l="1578" r="1569" t="22501"/>
           <a:stretch/>
         </p:blipFill>
         <p:spPr>
           <a:xfrm>
-            <a:off x="474375" y="2237000"/>
-            <a:ext cx="3867900" cy="979437"/>
+            <a:off x="474375" y="2622725"/>
+            <a:ext cx="3867900" cy="959701"/>
           </a:xfrm>
           <a:prstGeom prst="rect">
             <a:avLst/>
@@ -11498,7 +11722,7 @@
       </p:pic>
       <p:sp>
         <p:nvSpPr>
-          <p:cNvPr id="96" name="Google Shape;96;p15"/>
+          <p:cNvPr id="97" name="Google Shape;97;p15"/>
           <p:cNvSpPr txBox="1"/>
           <p:nvPr>
             <p:ph idx="1" type="body"/>
@@ -11506,8 +11730,8 @@
         </p:nvSpPr>
         <p:spPr>
           <a:xfrm>
-            <a:off x="474375" y="3343475"/>
-            <a:ext cx="3867900" cy="1018500"/>
+            <a:off x="462525" y="3709830"/>
+            <a:ext cx="3867900" cy="752400"/>
           </a:xfrm>
           <a:prstGeom prst="rect">
             <a:avLst/>
@@ -11537,116 +11761,8 @@
               <a:buNone/>
             </a:pPr>
             <a:r>
-              <a:rPr lang="en" sz="1400">
-                <a:solidFill>
-                  <a:srgbClr val="FFFFFF"/>
-                </a:solidFill>
-              </a:rPr>
-              <a:t>Notably, a </a:t>
-            </a:r>
-            <a:r>
-              <a:rPr b="1" lang="en" sz="1400">
-                <a:solidFill>
-                  <a:srgbClr val="FFFFFF"/>
-                </a:solidFill>
-              </a:rPr>
-              <a:t>powerful </a:t>
-            </a:r>
-            <a:r>
-              <a:rPr b="1" lang="en" sz="1400">
-                <a:solidFill>
-                  <a:srgbClr val="FFFFFF"/>
-                </a:solidFill>
-              </a:rPr>
-              <a:t>enough </a:t>
-            </a:r>
-            <a:r>
-              <a:rPr b="1" lang="en" sz="1400">
-                <a:solidFill>
-                  <a:srgbClr val="FFFFFF"/>
-                </a:solidFill>
-              </a:rPr>
-              <a:t>quantum computer</a:t>
-            </a:r>
-            <a:r>
-              <a:rPr lang="en" sz="1400">
-                <a:solidFill>
-                  <a:srgbClr val="FFFFFF"/>
-                </a:solidFill>
-              </a:rPr>
-              <a:t> can </a:t>
-            </a:r>
-            <a:r>
-              <a:rPr b="1" i="1" lang="en" sz="1400">
-                <a:solidFill>
-                  <a:srgbClr val="FFFFFF"/>
-                </a:solidFill>
-              </a:rPr>
-              <a:t>break</a:t>
-            </a:r>
-            <a:r>
-              <a:rPr lang="en" sz="1400">
-                <a:solidFill>
-                  <a:srgbClr val="FFFFFF"/>
-                </a:solidFill>
-              </a:rPr>
-              <a:t> current public key cryptography used for the </a:t>
-            </a:r>
-            <a:r>
-              <a:rPr b="1" lang="en" sz="1400">
-                <a:solidFill>
-                  <a:srgbClr val="FFFFFF"/>
-                </a:solidFill>
-              </a:rPr>
-              <a:t>Internet</a:t>
-            </a:r>
-            <a:r>
-              <a:rPr lang="en" sz="1400">
-                <a:solidFill>
-                  <a:srgbClr val="FFFFFF"/>
-                </a:solidFill>
-              </a:rPr>
-              <a:t>, </a:t>
-            </a:r>
-            <a:r>
-              <a:rPr b="1" lang="en" sz="1400">
-                <a:solidFill>
-                  <a:srgbClr val="FFFFFF"/>
-                </a:solidFill>
-              </a:rPr>
-              <a:t>Banks</a:t>
-            </a:r>
-            <a:r>
-              <a:rPr lang="en" sz="1400">
-                <a:solidFill>
-                  <a:srgbClr val="FFFFFF"/>
-                </a:solidFill>
-              </a:rPr>
-              <a:t>, </a:t>
-            </a:r>
-            <a:r>
-              <a:rPr b="1" lang="en" sz="1400">
-                <a:solidFill>
-                  <a:srgbClr val="FFFFFF"/>
-                </a:solidFill>
-              </a:rPr>
-              <a:t>Blockchain</a:t>
-            </a:r>
-            <a:r>
-              <a:rPr lang="en" sz="1400">
-                <a:solidFill>
-                  <a:srgbClr val="FFFFFF"/>
-                </a:solidFill>
-              </a:rPr>
-              <a:t>, and </a:t>
-            </a:r>
-            <a:r>
-              <a:rPr b="1" lang="en" sz="1400">
-                <a:solidFill>
-                  <a:srgbClr val="FFFFFF"/>
-                </a:solidFill>
-              </a:rPr>
-              <a:t>many other systems.</a:t>
+              <a:rPr lang="en" sz="1400"/>
+              <a:t>Many companies are already offering QaaS (Quantum as a Service) which allows anyone to rent quantum computer access in the cloud.</a:t>
             </a:r>
             <a:endParaRPr b="1" sz="1400">
               <a:solidFill>
@@ -11658,7 +11774,7 @@
       </p:sp>
       <p:sp>
         <p:nvSpPr>
-          <p:cNvPr id="97" name="Google Shape;97;p15"/>
+          <p:cNvPr id="98" name="Google Shape;98;p15"/>
           <p:cNvSpPr/>
           <p:nvPr/>
         </p:nvSpPr>
@@ -11705,7 +11821,7 @@
       </p:sp>
       <p:sp>
         <p:nvSpPr>
-          <p:cNvPr id="98" name="Google Shape;98;p15"/>
+          <p:cNvPr id="99" name="Google Shape;99;p15"/>
           <p:cNvSpPr txBox="1"/>
           <p:nvPr>
             <p:ph idx="1" type="body"/>
@@ -11713,8 +11829,8 @@
         </p:nvSpPr>
         <p:spPr>
           <a:xfrm>
-            <a:off x="474375" y="673675"/>
-            <a:ext cx="3867900" cy="1774200"/>
+            <a:off x="450675" y="710850"/>
+            <a:ext cx="3891600" cy="2225700"/>
           </a:xfrm>
           <a:prstGeom prst="rect">
             <a:avLst/>
@@ -11781,7 +11897,7 @@
             </a:pPr>
             <a:r>
               <a:rPr lang="en" sz="1400"/>
-              <a:t>This amount of active funding and by industry indicates that it’s </a:t>
+              <a:t>This amount of active funding by corporate and governmental entities indicate that quantum computing is </a:t>
             </a:r>
             <a:r>
               <a:rPr b="1" lang="en" sz="1400"/>
@@ -11793,7 +11909,7 @@
             </a:r>
             <a:r>
               <a:rPr b="1" lang="en" sz="1400"/>
-              <a:t>competitive commercial sector. </a:t>
+              <a:t>competitive sectors.</a:t>
             </a:r>
             <a:endParaRPr b="1" sz="1400"/>
           </a:p>
@@ -11801,7 +11917,7 @@
       </p:sp>
       <p:sp>
         <p:nvSpPr>
-          <p:cNvPr id="99" name="Google Shape;99;p15"/>
+          <p:cNvPr id="100" name="Google Shape;100;p15"/>
           <p:cNvSpPr txBox="1"/>
           <p:nvPr>
             <p:ph idx="1" type="body"/>
@@ -11809,8 +11925,8 @@
         </p:nvSpPr>
         <p:spPr>
           <a:xfrm>
-            <a:off x="4800600" y="673675"/>
-            <a:ext cx="3914100" cy="4013400"/>
+            <a:off x="4800600" y="710850"/>
+            <a:ext cx="3891600" cy="5247000"/>
           </a:xfrm>
           <a:prstGeom prst="rect">
             <a:avLst/>
@@ -11845,7 +11961,7 @@
                   <a:schemeClr val="accent1"/>
                 </a:solidFill>
               </a:rPr>
-              <a:t>This threat</a:t>
+              <a:t>The Quantum Threat</a:t>
             </a:r>
             <a:r>
               <a:rPr lang="en" sz="1400">
@@ -11853,7 +11969,7 @@
                   <a:schemeClr val="accent1"/>
                 </a:solidFill>
               </a:rPr>
-              <a:t> is well recognised by industry leaders </a:t>
+              <a:t> (Y2Q) is recognised by industry leaders </a:t>
             </a:r>
             <a:r>
               <a:rPr lang="en" sz="1400">
@@ -11869,11 +11985,7 @@
                   <a:schemeClr val="accent1"/>
                 </a:solidFill>
               </a:rPr>
-              <a:t> </a:t>
-            </a:r>
-            <a:r>
-              <a:rPr lang="en" sz="1400"/>
-              <a:t>Cloudflare, Google, and others.</a:t>
+              <a:t> IBM, Google, Microsoft, Intel, and others.</a:t>
             </a:r>
             <a:endParaRPr sz="1400"/>
           </a:p>
@@ -11891,13 +12003,17 @@
               <a:buSzPts val="770"/>
               <a:buNone/>
             </a:pPr>
+            <a:r>
+              <a:rPr lang="en" sz="1400"/>
+              <a:t>For existing blockchains, </a:t>
+            </a:r>
             <a:r>
               <a:rPr lang="en" sz="1400">
                 <a:solidFill>
                   <a:srgbClr val="FFFFFF"/>
                 </a:solidFill>
               </a:rPr>
-              <a:t>With the understanding this </a:t>
+              <a:t>this </a:t>
             </a:r>
             <a:r>
               <a:rPr b="1" i="1" lang="en" sz="1400">
@@ -11905,24 +12021,28 @@
                   <a:srgbClr val="FFFFFF"/>
                 </a:solidFill>
               </a:rPr>
-              <a:t>won’t be a drop-in replacement</a:t>
+              <a:t>w</a:t>
             </a:r>
             <a:r>
-              <a:rPr lang="en" sz="1400">
+              <a:rPr b="1" i="1" lang="en" sz="1400"/>
+              <a:t>ill not </a:t>
+            </a:r>
+            <a:r>
+              <a:rPr b="1" i="1" lang="en" sz="1400">
                 <a:solidFill>
                   <a:srgbClr val="FFFFFF"/>
                 </a:solidFill>
               </a:rPr>
-              <a:t> and require and time to implement and migrate, preparations are being made.</a:t>
+              <a:t>be a simple drop-in replacement or </a:t>
             </a:r>
-            <a:endParaRPr sz="1400">
-              <a:solidFill>
-                <a:srgbClr val="FFFFFF"/>
-              </a:solidFill>
-            </a:endParaRPr>
+            <a:r>
+              <a:rPr b="1" i="1" lang="en" sz="1400"/>
+              <a:t>fork because the underlying addressing scheme is vulnerable.</a:t>
+            </a:r>
+            <a:endParaRPr sz="1400"/>
           </a:p>
           <a:p>
-            <a:pPr indent="-317500" lvl="0" marL="457200" rtl="0" algn="l">
+            <a:pPr indent="0" lvl="0" marL="0" rtl="0" algn="l">
               <a:lnSpc>
                 <a:spcPct val="105000"/>
               </a:lnSpc>
@@ -11932,11 +12052,8 @@
               <a:spcAft>
                 <a:spcPts val="0"/>
               </a:spcAft>
-              <a:buClr>
-                <a:srgbClr val="FFFFFF"/>
-              </a:buClr>
-              <a:buSzPts val="1400"/>
-              <a:buChar char="•"/>
+              <a:buSzPts val="770"/>
+              <a:buNone/>
             </a:pPr>
             <a:r>
               <a:rPr lang="en" sz="1400">
@@ -11956,7 +12073,19 @@
                   <a:srgbClr val="FFFFFF"/>
                 </a:solidFill>
               </a:rPr>
-              <a:t> cryptographic algorithms.</a:t>
+              <a:t> cryptograph</a:t>
+            </a:r>
+            <a:r>
+              <a:rPr lang="en" sz="1400"/>
+              <a:t>y.</a:t>
+            </a:r>
+            <a:r>
+              <a:rPr lang="en" sz="1400">
+                <a:solidFill>
+                  <a:srgbClr val="FFFFFF"/>
+                </a:solidFill>
+              </a:rPr>
+              <a:t> </a:t>
             </a:r>
             <a:endParaRPr sz="1400">
               <a:solidFill>
@@ -11970,7 +12099,7 @@
                 <a:spcPct val="105000"/>
               </a:lnSpc>
               <a:spcBef>
-                <a:spcPts val="0"/>
+                <a:spcPts val="800"/>
               </a:spcBef>
               <a:spcAft>
                 <a:spcPts val="0"/>
@@ -12022,7 +12151,19 @@
                   <a:srgbClr val="FFFFFF"/>
                 </a:solidFill>
               </a:rPr>
-              <a:t>GOOGLE is currently testing quantum cryptography that you can enable in your browser.</a:t>
+              <a:t>G</a:t>
+            </a:r>
+            <a:r>
+              <a:rPr lang="en" sz="1400"/>
+              <a:t>oogle</a:t>
+            </a:r>
+            <a:r>
+              <a:rPr lang="en" sz="1400">
+                <a:solidFill>
+                  <a:srgbClr val="FFFFFF"/>
+                </a:solidFill>
+              </a:rPr>
+              <a:t> is currently testing quantum cryptography that you can enable in your browser.</a:t>
             </a:r>
             <a:endParaRPr sz="1400">
               <a:solidFill>
@@ -12049,7 +12190,7 @@
                   <a:schemeClr val="accent1"/>
                 </a:solidFill>
               </a:rPr>
-              <a:t>Fatally, this impacts Bitcoin, Ethereum, Dogecoin, and 99%+ of other </a:t>
+              <a:t>The brightest minds in the world are working on solutions to the Quantum Threat </a:t>
             </a:r>
             <a:br>
               <a:rPr b="1" lang="en" sz="1400">
@@ -12064,7 +12205,7 @@
                   <a:schemeClr val="accent1"/>
                 </a:solidFill>
               </a:rPr>
-              <a:t>cryptocurrencies.</a:t>
+              <a:t>problem.</a:t>
             </a:r>
             <a:endParaRPr b="1" sz="1400">
               <a:solidFill>
@@ -12087,7 +12228,7 @@
   <p:cSld>
     <p:spTree>
       <p:nvGrpSpPr>
-        <p:cNvPr id="104" name="Shape 104"/>
+        <p:cNvPr id="105" name="Shape 105"/>
         <p:cNvGrpSpPr/>
         <p:nvPr/>
       </p:nvGrpSpPr>
@@ -12101,7 +12242,7 @@
       </p:grpSpPr>
       <p:sp>
         <p:nvSpPr>
-          <p:cNvPr id="105" name="Google Shape;105;p16"/>
+          <p:cNvPr id="106" name="Google Shape;106;p16"/>
           <p:cNvSpPr txBox="1"/>
           <p:nvPr>
             <p:ph type="title"/>
@@ -12158,7 +12299,7 @@
       </p:sp>
       <p:pic>
         <p:nvPicPr>
-          <p:cNvPr id="106" name="Google Shape;106;p16"/>
+          <p:cNvPr id="107" name="Google Shape;107;p16"/>
           <p:cNvPicPr preferRelativeResize="0"/>
           <p:nvPr/>
         </p:nvPicPr>
@@ -12172,8 +12313,8 @@
         </p:blipFill>
         <p:spPr>
           <a:xfrm>
-            <a:off x="895475" y="2593125"/>
-            <a:ext cx="3116325" cy="2273800"/>
+            <a:off x="1228634" y="3088475"/>
+            <a:ext cx="2343325" cy="1709799"/>
           </a:xfrm>
           <a:prstGeom prst="rect">
             <a:avLst/>
@@ -12186,7 +12327,7 @@
       </p:pic>
       <p:sp>
         <p:nvSpPr>
-          <p:cNvPr id="107" name="Google Shape;107;p16"/>
+          <p:cNvPr id="108" name="Google Shape;108;p16"/>
           <p:cNvSpPr txBox="1"/>
           <p:nvPr>
             <p:ph idx="1" type="body"/>
@@ -12194,8 +12335,8 @@
         </p:nvSpPr>
         <p:spPr>
           <a:xfrm>
-            <a:off x="457200" y="685800"/>
-            <a:ext cx="3886200" cy="1745100"/>
+            <a:off x="457200" y="710850"/>
+            <a:ext cx="3886200" cy="2197500"/>
           </a:xfrm>
           <a:prstGeom prst="rect">
             <a:avLst/>
@@ -12229,7 +12370,22 @@
                   <a:schemeClr val="accent1"/>
                 </a:solidFill>
               </a:rPr>
-              <a:t>Bitcoin, Ethereum, Dogecoin, and 99%+ of other cryptocurrencies  aren’t post-quantum secure.</a:t>
+              <a:t>This threat impacts Bitcoin, Ethereum, Dogecoin, and 99%+ of other </a:t>
+            </a:r>
+            <a:br>
+              <a:rPr b="1" lang="en" sz="1400">
+                <a:solidFill>
+                  <a:schemeClr val="accent1"/>
+                </a:solidFill>
+              </a:rPr>
+            </a:br>
+            <a:r>
+              <a:rPr b="1" lang="en" sz="1400">
+                <a:solidFill>
+                  <a:schemeClr val="accent1"/>
+                </a:solidFill>
+              </a:rPr>
+              <a:t>Cryptocurrencies.</a:t>
             </a:r>
             <a:endParaRPr sz="1400">
               <a:solidFill>
@@ -12252,11 +12408,11 @@
             </a:pPr>
             <a:r>
               <a:rPr b="1" lang="en" sz="1400"/>
-              <a:t>With trillions on the line</a:t>
+              <a:t>With and industry of trillions on the line</a:t>
             </a:r>
             <a:r>
               <a:rPr lang="en" sz="1400"/>
-              <a:t>, even a </a:t>
+              <a:t>, if there is even a </a:t>
             </a:r>
             <a:r>
               <a:rPr b="1" lang="en" sz="1400"/>
@@ -12264,7 +12420,7 @@
             </a:r>
             <a:r>
               <a:rPr lang="en" sz="1400"/>
-              <a:t> of a technology undoing everything would be too much. This is a problem, considering, </a:t>
+              <a:t> of quantum technology disrupting cryptography and blockchain, the risk is too high. This is a problem, considering </a:t>
             </a:r>
             <a:r>
               <a:rPr b="1" lang="en" sz="1400">
@@ -12276,7 +12432,7 @@
             </a:r>
             <a:r>
               <a:rPr lang="en" sz="1400"/>
-              <a:t> of that happening in the </a:t>
+              <a:t> of cryptographic disruption in the </a:t>
             </a:r>
             <a:r>
               <a:rPr b="1" lang="en" sz="1400">
@@ -12300,7 +12456,7 @@
       </p:sp>
       <p:sp>
         <p:nvSpPr>
-          <p:cNvPr id="108" name="Google Shape;108;p16"/>
+          <p:cNvPr id="109" name="Google Shape;109;p16"/>
           <p:cNvSpPr txBox="1"/>
           <p:nvPr>
             <p:ph idx="1" type="body"/>
@@ -12308,8 +12464,8 @@
         </p:nvSpPr>
         <p:spPr>
           <a:xfrm>
-            <a:off x="4800600" y="1865300"/>
-            <a:ext cx="3886200" cy="2649900"/>
+            <a:off x="4800600" y="710850"/>
+            <a:ext cx="3886200" cy="3431400"/>
           </a:xfrm>
           <a:prstGeom prst="rect">
             <a:avLst/>
@@ -12343,7 +12499,38 @@
                   <a:schemeClr val="accent1"/>
                 </a:solidFill>
               </a:rPr>
-              <a:t>There’s no drop-in replacement. </a:t>
+              <a:t>Why won't a fork or a software upgrade fix existing blockchains?</a:t>
+            </a:r>
+            <a:endParaRPr b="1" sz="1400">
+              <a:solidFill>
+                <a:schemeClr val="accent1"/>
+              </a:solidFill>
+            </a:endParaRPr>
+          </a:p>
+          <a:p>
+            <a:pPr indent="0" lvl="0" marL="0" rtl="0" algn="l">
+              <a:lnSpc>
+                <a:spcPct val="105000"/>
+              </a:lnSpc>
+              <a:spcBef>
+                <a:spcPts val="800"/>
+              </a:spcBef>
+              <a:spcAft>
+                <a:spcPts val="0"/>
+              </a:spcAft>
+              <a:buNone/>
+            </a:pPr>
+            <a:r>
+              <a:rPr lang="en" sz="1400">
+                <a:solidFill>
+                  <a:srgbClr val="FFFFFF"/>
+                </a:solidFill>
+              </a:rPr>
+              <a:t>Blockchains are immutable, meaning that in many cases, vulnerable public addresses</a:t>
+            </a:r>
+            <a:r>
+              <a:rPr lang="en" sz="1400"/>
+              <a:t> are written to the ledger for all to view. The reason for this is so that each node can verify the validity of each transaction. </a:t>
             </a:r>
             <a:r>
               <a:rPr lang="en" sz="1400">
@@ -12351,7 +12538,7 @@
                   <a:srgbClr val="FFFFFF"/>
                 </a:solidFill>
               </a:rPr>
-              <a:t>Making something post-quantum secure takes considerable time and effort, often requiring significant changes to the underlying network and code due signature size considerations. Past updates which are </a:t>
+              <a:t>Past updates which are </a:t>
             </a:r>
             <a:r>
               <a:rPr i="1" lang="en" sz="1400">
@@ -12399,7 +12586,7 @@
                   <a:srgbClr val="FFFFFF"/>
                 </a:solidFill>
               </a:rPr>
-              <a:t>A migration will be necessary,</a:t>
+              <a:t>An address migration will be necessary,</a:t>
             </a:r>
             <a:r>
               <a:rPr b="1" lang="en" sz="1400">
@@ -12431,11 +12618,11 @@
                   <a:srgbClr val="FFFFFF"/>
                 </a:solidFill>
               </a:rPr>
-              <a:t>, and may not be possible in a</a:t>
+              <a:t>, may not be possible in a</a:t>
             </a:r>
             <a:r>
               <a:rPr lang="en" sz="1400"/>
-              <a:t>ll cases.</a:t>
+              <a:t>ll cases, and may not work for all users.</a:t>
             </a:r>
             <a:endParaRPr sz="1400"/>
           </a:p>
@@ -12460,7 +12647,7 @@
               </a:rPr>
               <a:t>The time to update &amp; migrate might already be too late for many blockchains. </a:t>
             </a:r>
-            <a:endParaRPr b="1" sz="1400">
+            <a:endParaRPr b="1" sz="1200">
               <a:solidFill>
                 <a:schemeClr val="accent1"/>
               </a:solidFill>
@@ -12468,34 +12655,6 @@
           </a:p>
         </p:txBody>
       </p:sp>
-      <p:pic>
-        <p:nvPicPr>
-          <p:cNvPr id="109" name="Google Shape;109;p16"/>
-          <p:cNvPicPr preferRelativeResize="0"/>
-          <p:nvPr/>
-        </p:nvPicPr>
-        <p:blipFill>
-          <a:blip r:embed="rId4">
-            <a:alphaModFix/>
-          </a:blip>
-          <a:stretch>
-            <a:fillRect/>
-          </a:stretch>
-        </p:blipFill>
-        <p:spPr>
-          <a:xfrm>
-            <a:off x="5157613" y="685800"/>
-            <a:ext cx="3343275" cy="1085850"/>
-          </a:xfrm>
-          <a:prstGeom prst="rect">
-            <a:avLst/>
-          </a:prstGeom>
-          <a:noFill/>
-          <a:ln>
-            <a:noFill/>
-          </a:ln>
-        </p:spPr>
-      </p:pic>
     </p:spTree>
   </p:cSld>
   <p:clrMapOvr>
@@ -13191,7 +13350,7 @@
             </a:pPr>
             <a:r>
               <a:rPr lang="en" sz="1400"/>
-              <a:t>We are a dedicated team of code developers, PhD post-quantum cryptographers, and engineering professionals who created the first industrial-grade, provably quantum-secure cryptocurrency. </a:t>
+              <a:t>We are a dedicated team of code developers, PhD post-quantum cryptographers, and engineering professionals who created the first industrial-grade, provably quantum-secure cryptocurrency using an NIST-recommended addressing scheme.</a:t>
             </a:r>
             <a:endParaRPr sz="1400"/>
           </a:p>
@@ -13395,7 +13554,7 @@
         </p:blipFill>
         <p:spPr>
           <a:xfrm>
-            <a:off x="4800600" y="228600"/>
+            <a:off x="4800600" y="356450"/>
             <a:ext cx="3886200" cy="4067556"/>
           </a:xfrm>
           <a:prstGeom prst="rect">
@@ -14181,8 +14340,8 @@
         </p:nvSpPr>
         <p:spPr>
           <a:xfrm>
-            <a:off x="457200" y="710856"/>
-            <a:ext cx="3886200" cy="4651500"/>
+            <a:off x="457200" y="710851"/>
+            <a:ext cx="3886200" cy="840000"/>
           </a:xfrm>
           <a:prstGeom prst="rect">
             <a:avLst/>
@@ -14245,56 +14404,34 @@
               </a:rPr>
               <a:t>Let's talk!</a:t>
             </a:r>
-            <a:endParaRPr i="1" sz="1400">
-              <a:solidFill>
-                <a:srgbClr val="FFFFFF"/>
-              </a:solidFill>
-            </a:endParaRPr>
+            <a:endParaRPr sz="1400"/>
           </a:p>
-          <a:p>
-            <a:pPr indent="0" lvl="0" marL="0" rtl="0" algn="l">
-              <a:lnSpc>
-                <a:spcPct val="105000"/>
-              </a:lnSpc>
-              <a:spcBef>
-                <a:spcPts val="800"/>
-              </a:spcBef>
-              <a:spcAft>
-                <a:spcPts val="0"/>
-              </a:spcAft>
-              <a:buNone/>
-            </a:pPr>
-            <a:r>
-              <a:t/>
-            </a:r>
-            <a:endParaRPr sz="1400">
-              <a:solidFill>
-                <a:srgbClr val="FFFFFF"/>
-              </a:solidFill>
-            </a:endParaRPr>
-          </a:p>
-          <a:p>
-            <a:pPr indent="0" lvl="0" marL="0" rtl="0" algn="l">
-              <a:lnSpc>
-                <a:spcPct val="105000"/>
-              </a:lnSpc>
-              <a:spcBef>
-                <a:spcPts val="800"/>
-              </a:spcBef>
-              <a:spcAft>
-                <a:spcPts val="0"/>
-              </a:spcAft>
-              <a:buNone/>
-            </a:pPr>
-            <a:r>
-              <a:t/>
-            </a:r>
-            <a:endParaRPr sz="1400">
-              <a:solidFill>
-                <a:srgbClr val="FFFFFF"/>
-              </a:solidFill>
-            </a:endParaRPr>
-          </a:p>
+        </p:txBody>
+      </p:sp>
+      <p:sp>
+        <p:nvSpPr>
+          <p:cNvPr id="152" name="Google Shape;152;p20"/>
+          <p:cNvSpPr txBox="1"/>
+          <p:nvPr/>
+        </p:nvSpPr>
+        <p:spPr>
+          <a:xfrm>
+            <a:off x="4800600" y="2459145"/>
+            <a:ext cx="3886200" cy="1780500"/>
+          </a:xfrm>
+          <a:prstGeom prst="rect">
+            <a:avLst/>
+          </a:prstGeom>
+          <a:noFill/>
+          <a:ln>
+            <a:noFill/>
+          </a:ln>
+        </p:spPr>
+        <p:txBody>
+          <a:bodyPr anchorCtr="0" anchor="t" bIns="91425" lIns="91425" spcFirstLastPara="1" rIns="91425" wrap="square" tIns="91425">
+            <a:spAutoFit/>
+          </a:bodyPr>
+          <a:lstStyle/>
           <a:p>
             <a:pPr indent="0" lvl="0" marL="0" rtl="0" algn="l">
               <a:lnSpc>
@@ -14318,7 +14455,260 @@
                 <a:cs typeface="Ropa Sans"/>
                 <a:sym typeface="Ropa Sans"/>
               </a:rPr>
-              <a:t>Press enquiries</a:t>
+              <a:t>Social</a:t>
+            </a:r>
+            <a:endParaRPr>
+              <a:solidFill>
+                <a:srgbClr val="FFFFFF"/>
+              </a:solidFill>
+              <a:latin typeface="Source Sans Pro"/>
+              <a:ea typeface="Source Sans Pro"/>
+              <a:cs typeface="Source Sans Pro"/>
+              <a:sym typeface="Source Sans Pro"/>
+            </a:endParaRPr>
+          </a:p>
+          <a:p>
+            <a:pPr indent="0" lvl="0" marL="0" rtl="0" algn="l">
+              <a:lnSpc>
+                <a:spcPct val="105000"/>
+              </a:lnSpc>
+              <a:spcBef>
+                <a:spcPts val="800"/>
+              </a:spcBef>
+              <a:spcAft>
+                <a:spcPts val="0"/>
+              </a:spcAft>
+              <a:buNone/>
+            </a:pPr>
+            <a:r>
+              <a:rPr lang="en">
+                <a:solidFill>
+                  <a:srgbClr val="FFFFFF"/>
+                </a:solidFill>
+                <a:latin typeface="Source Sans Pro"/>
+                <a:ea typeface="Source Sans Pro"/>
+                <a:cs typeface="Source Sans Pro"/>
+                <a:sym typeface="Source Sans Pro"/>
+              </a:rPr>
+              <a:t>Discord: </a:t>
+            </a:r>
+            <a:r>
+              <a:rPr lang="en" u="sng">
+                <a:solidFill>
+                  <a:schemeClr val="hlink"/>
+                </a:solidFill>
+                <a:latin typeface="Source Sans Pro"/>
+                <a:ea typeface="Source Sans Pro"/>
+                <a:cs typeface="Source Sans Pro"/>
+                <a:sym typeface="Source Sans Pro"/>
+                <a:hlinkClick r:id="rId3"/>
+              </a:rPr>
+              <a:t>https://www.discord.gg/qrl</a:t>
+            </a:r>
+            <a:endParaRPr>
+              <a:solidFill>
+                <a:srgbClr val="FFFFFF"/>
+              </a:solidFill>
+              <a:latin typeface="Source Sans Pro"/>
+              <a:ea typeface="Source Sans Pro"/>
+              <a:cs typeface="Source Sans Pro"/>
+              <a:sym typeface="Source Sans Pro"/>
+            </a:endParaRPr>
+          </a:p>
+          <a:p>
+            <a:pPr indent="0" lvl="0" marL="0" rtl="0" algn="l">
+              <a:lnSpc>
+                <a:spcPct val="105000"/>
+              </a:lnSpc>
+              <a:spcBef>
+                <a:spcPts val="800"/>
+              </a:spcBef>
+              <a:spcAft>
+                <a:spcPts val="0"/>
+              </a:spcAft>
+              <a:buNone/>
+            </a:pPr>
+            <a:r>
+              <a:rPr lang="en">
+                <a:solidFill>
+                  <a:srgbClr val="FFFFFF"/>
+                </a:solidFill>
+                <a:latin typeface="Source Sans Pro"/>
+                <a:ea typeface="Source Sans Pro"/>
+                <a:cs typeface="Source Sans Pro"/>
+                <a:sym typeface="Source Sans Pro"/>
+              </a:rPr>
+              <a:t>Reddit: </a:t>
+            </a:r>
+            <a:r>
+              <a:rPr lang="en" u="sng">
+                <a:solidFill>
+                  <a:schemeClr val="hlink"/>
+                </a:solidFill>
+                <a:latin typeface="Source Sans Pro"/>
+                <a:ea typeface="Source Sans Pro"/>
+                <a:cs typeface="Source Sans Pro"/>
+                <a:sym typeface="Source Sans Pro"/>
+                <a:hlinkClick r:id="rId4"/>
+              </a:rPr>
+              <a:t>https://www.reddit.com/r/qrl</a:t>
+            </a:r>
+            <a:endParaRPr>
+              <a:solidFill>
+                <a:srgbClr val="FFFFFF"/>
+              </a:solidFill>
+              <a:latin typeface="Source Sans Pro"/>
+              <a:ea typeface="Source Sans Pro"/>
+              <a:cs typeface="Source Sans Pro"/>
+              <a:sym typeface="Source Sans Pro"/>
+            </a:endParaRPr>
+          </a:p>
+          <a:p>
+            <a:pPr indent="0" lvl="0" marL="0" rtl="0" algn="l">
+              <a:lnSpc>
+                <a:spcPct val="105000"/>
+              </a:lnSpc>
+              <a:spcBef>
+                <a:spcPts val="800"/>
+              </a:spcBef>
+              <a:spcAft>
+                <a:spcPts val="0"/>
+              </a:spcAft>
+              <a:buNone/>
+            </a:pPr>
+            <a:r>
+              <a:rPr lang="en">
+                <a:solidFill>
+                  <a:srgbClr val="FFFFFF"/>
+                </a:solidFill>
+                <a:latin typeface="Source Sans Pro"/>
+                <a:ea typeface="Source Sans Pro"/>
+                <a:cs typeface="Source Sans Pro"/>
+                <a:sym typeface="Source Sans Pro"/>
+              </a:rPr>
+              <a:t>Twitter: </a:t>
+            </a:r>
+            <a:r>
+              <a:rPr lang="en" u="sng">
+                <a:solidFill>
+                  <a:schemeClr val="hlink"/>
+                </a:solidFill>
+                <a:latin typeface="Source Sans Pro"/>
+                <a:ea typeface="Source Sans Pro"/>
+                <a:cs typeface="Source Sans Pro"/>
+                <a:sym typeface="Source Sans Pro"/>
+                <a:hlinkClick r:id="rId5"/>
+              </a:rPr>
+              <a:t>https://twitter.com/QRLedger</a:t>
+            </a:r>
+            <a:endParaRPr>
+              <a:solidFill>
+                <a:srgbClr val="FFFFFF"/>
+              </a:solidFill>
+              <a:latin typeface="Source Sans Pro"/>
+              <a:ea typeface="Source Sans Pro"/>
+              <a:cs typeface="Source Sans Pro"/>
+              <a:sym typeface="Source Sans Pro"/>
+            </a:endParaRPr>
+          </a:p>
+          <a:p>
+            <a:pPr indent="0" lvl="0" marL="0" rtl="0" algn="l">
+              <a:lnSpc>
+                <a:spcPct val="105000"/>
+              </a:lnSpc>
+              <a:spcBef>
+                <a:spcPts val="800"/>
+              </a:spcBef>
+              <a:spcAft>
+                <a:spcPts val="0"/>
+              </a:spcAft>
+              <a:buNone/>
+            </a:pPr>
+            <a:r>
+              <a:rPr lang="en">
+                <a:solidFill>
+                  <a:srgbClr val="FFFFFF"/>
+                </a:solidFill>
+                <a:latin typeface="Source Sans Pro"/>
+                <a:ea typeface="Source Sans Pro"/>
+                <a:cs typeface="Source Sans Pro"/>
+                <a:sym typeface="Source Sans Pro"/>
+              </a:rPr>
+              <a:t>YouTube: </a:t>
+            </a:r>
+            <a:r>
+              <a:rPr lang="en" u="sng">
+                <a:solidFill>
+                  <a:schemeClr val="hlink"/>
+                </a:solidFill>
+                <a:latin typeface="Source Sans Pro"/>
+                <a:ea typeface="Source Sans Pro"/>
+                <a:cs typeface="Source Sans Pro"/>
+                <a:sym typeface="Source Sans Pro"/>
+                <a:hlinkClick r:id="rId6"/>
+              </a:rPr>
+              <a:t>https://youtube.com/c/QRLedger</a:t>
+            </a:r>
+            <a:endParaRPr>
+              <a:solidFill>
+                <a:srgbClr val="FFFFFF"/>
+              </a:solidFill>
+              <a:latin typeface="Source Sans Pro"/>
+              <a:ea typeface="Source Sans Pro"/>
+              <a:cs typeface="Source Sans Pro"/>
+              <a:sym typeface="Source Sans Pro"/>
+            </a:endParaRPr>
+          </a:p>
+        </p:txBody>
+      </p:sp>
+      <p:sp>
+        <p:nvSpPr>
+          <p:cNvPr id="153" name="Google Shape;153;p20"/>
+          <p:cNvSpPr txBox="1"/>
+          <p:nvPr/>
+        </p:nvSpPr>
+        <p:spPr>
+          <a:xfrm>
+            <a:off x="457200" y="1748185"/>
+            <a:ext cx="1866000" cy="1516200"/>
+          </a:xfrm>
+          <a:prstGeom prst="rect">
+            <a:avLst/>
+          </a:prstGeom>
+          <a:noFill/>
+          <a:ln>
+            <a:noFill/>
+          </a:ln>
+        </p:spPr>
+        <p:txBody>
+          <a:bodyPr anchorCtr="0" anchor="t" bIns="91425" lIns="91425" spcFirstLastPara="1" rIns="91425" wrap="square" tIns="91425">
+            <a:spAutoFit/>
+          </a:bodyPr>
+          <a:lstStyle/>
+          <a:p>
+            <a:pPr indent="0" lvl="0" marL="0" rtl="0" algn="l">
+              <a:lnSpc>
+                <a:spcPct val="105000"/>
+              </a:lnSpc>
+              <a:spcBef>
+                <a:spcPts val="800"/>
+              </a:spcBef>
+              <a:spcAft>
+                <a:spcPts val="0"/>
+              </a:spcAft>
+              <a:buNone/>
+            </a:pPr>
+            <a:r>
+              <a:rPr b="1" lang="en" sz="1800">
+                <a:solidFill>
+                  <a:schemeClr val="accent1"/>
+                </a:solidFill>
+                <a:latin typeface="Ropa Sans"/>
+                <a:ea typeface="Ropa Sans"/>
+                <a:cs typeface="Ropa Sans"/>
+                <a:sym typeface="Ropa Sans"/>
+              </a:rPr>
+              <a:t>Press inquiries</a:t>
             </a:r>
             <a:endParaRPr b="1" sz="1800">
               <a:solidFill>
@@ -14344,15 +14734,27 @@
               <a:buNone/>
             </a:pPr>
             <a:r>
-              <a:rPr lang="en" sz="1400" u="sng">
+              <a:rPr lang="en" u="sng">
                 <a:solidFill>
                   <a:schemeClr val="hlink"/>
                 </a:solidFill>
-                <a:hlinkClick r:id="rId3"/>
+                <a:latin typeface="Source Sans Pro"/>
+                <a:ea typeface="Source Sans Pro"/>
+                <a:cs typeface="Source Sans Pro"/>
+                <a:sym typeface="Source Sans Pro"/>
+                <a:hlinkClick r:id="rId7"/>
               </a:rPr>
               <a:t>press@theqrl.org</a:t>
             </a:r>
-            <a:endParaRPr sz="1400"/>
+            <a:endParaRPr>
+              <a:solidFill>
+                <a:srgbClr val="FFFFFF"/>
+              </a:solidFill>
+              <a:latin typeface="Source Sans Pro"/>
+              <a:ea typeface="Source Sans Pro"/>
+              <a:cs typeface="Source Sans Pro"/>
+              <a:sym typeface="Source Sans Pro"/>
+            </a:endParaRPr>
           </a:p>
           <a:p>
             <a:pPr indent="0" lvl="0" marL="0" rtl="0" algn="l">
@@ -14403,141 +14805,32 @@
               <a:buNone/>
             </a:pPr>
             <a:r>
-              <a:rPr lang="en" sz="1400" u="sng">
+              <a:rPr lang="en" u="sng">
                 <a:solidFill>
                   <a:schemeClr val="hlink"/>
                 </a:solidFill>
-                <a:hlinkClick r:id="rId4"/>
+                <a:latin typeface="Source Sans Pro"/>
+                <a:ea typeface="Source Sans Pro"/>
+                <a:cs typeface="Source Sans Pro"/>
+                <a:sym typeface="Source Sans Pro"/>
+                <a:hlinkClick r:id="rId8"/>
               </a:rPr>
               <a:t>support@theqrl.org</a:t>
             </a:r>
-            <a:endParaRPr sz="1400"/>
-          </a:p>
-          <a:p>
-            <a:pPr indent="0" lvl="0" marL="0" rtl="0" algn="l">
-              <a:lnSpc>
-                <a:spcPct val="105000"/>
-              </a:lnSpc>
-              <a:spcBef>
-                <a:spcPts val="800"/>
-              </a:spcBef>
-              <a:spcAft>
-                <a:spcPts val="0"/>
-              </a:spcAft>
-              <a:buNone/>
-            </a:pPr>
-            <a:r>
-              <a:rPr b="1" lang="en" sz="1800">
-                <a:solidFill>
-                  <a:schemeClr val="accent1"/>
-                </a:solidFill>
-                <a:latin typeface="Ropa Sans"/>
-                <a:ea typeface="Ropa Sans"/>
-                <a:cs typeface="Ropa Sans"/>
-                <a:sym typeface="Ropa Sans"/>
-              </a:rPr>
-              <a:t>General enquiries</a:t>
-            </a:r>
-            <a:endParaRPr b="1" sz="1800">
-              <a:solidFill>
-                <a:schemeClr val="accent1"/>
-              </a:solidFill>
-              <a:latin typeface="Ropa Sans"/>
-              <a:ea typeface="Ropa Sans"/>
-              <a:cs typeface="Ropa Sans"/>
-              <a:sym typeface="Ropa Sans"/>
-            </a:endParaRPr>
-          </a:p>
-          <a:p>
-            <a:pPr indent="0" lvl="0" marL="0" rtl="0" algn="l">
-              <a:lnSpc>
-                <a:spcPct val="105000"/>
-              </a:lnSpc>
-              <a:spcBef>
-                <a:spcPts val="800"/>
-              </a:spcBef>
-              <a:spcAft>
-                <a:spcPts val="0"/>
-              </a:spcAft>
-              <a:buNone/>
-            </a:pPr>
-            <a:r>
-              <a:rPr lang="en" sz="1400" u="sng">
-                <a:solidFill>
-                  <a:schemeClr val="hlink"/>
-                </a:solidFill>
-                <a:hlinkClick r:id="rId5"/>
-              </a:rPr>
-              <a:t>info@theqrl.org</a:t>
-            </a:r>
-            <a:endParaRPr sz="1400"/>
-          </a:p>
-          <a:p>
-            <a:pPr indent="0" lvl="0" marL="0" rtl="0" algn="l">
-              <a:lnSpc>
-                <a:spcPct val="105000"/>
-              </a:lnSpc>
-              <a:spcBef>
-                <a:spcPts val="800"/>
-              </a:spcBef>
-              <a:spcAft>
-                <a:spcPts val="0"/>
-              </a:spcAft>
-              <a:buNone/>
-            </a:pPr>
-            <a:r>
-              <a:t/>
-            </a:r>
-            <a:endParaRPr sz="1400"/>
-          </a:p>
-          <a:p>
-            <a:pPr indent="0" lvl="0" marL="0" rtl="0" algn="l">
-              <a:lnSpc>
-                <a:spcPct val="105000"/>
-              </a:lnSpc>
-              <a:spcBef>
-                <a:spcPts val="800"/>
-              </a:spcBef>
-              <a:spcAft>
-                <a:spcPts val="0"/>
-              </a:spcAft>
-              <a:buNone/>
-            </a:pPr>
-            <a:r>
-              <a:t/>
-            </a:r>
-            <a:endParaRPr sz="1400"/>
-          </a:p>
-          <a:p>
-            <a:pPr indent="0" lvl="0" marL="0" rtl="0" algn="l">
-              <a:lnSpc>
-                <a:spcPct val="105000"/>
-              </a:lnSpc>
-              <a:spcBef>
-                <a:spcPts val="800"/>
-              </a:spcBef>
-              <a:spcAft>
-                <a:spcPts val="0"/>
-              </a:spcAft>
-              <a:buNone/>
-            </a:pPr>
-            <a:r>
-              <a:t/>
-            </a:r>
-            <a:endParaRPr sz="1400"/>
+            <a:endParaRPr/>
           </a:p>
         </p:txBody>
       </p:sp>
       <p:sp>
         <p:nvSpPr>
-          <p:cNvPr id="152" name="Google Shape;152;p20"/>
+          <p:cNvPr id="154" name="Google Shape;154;p20"/>
           <p:cNvSpPr txBox="1"/>
           <p:nvPr/>
         </p:nvSpPr>
         <p:spPr>
           <a:xfrm>
-            <a:off x="4800600" y="2179275"/>
-            <a:ext cx="3886200" cy="2109300"/>
+            <a:off x="2381245" y="2459155"/>
+            <a:ext cx="1999200" cy="793800"/>
           </a:xfrm>
           <a:prstGeom prst="rect">
             <a:avLst/>
@@ -14575,7 +14868,7 @@
                 <a:cs typeface="Ropa Sans"/>
                 <a:sym typeface="Ropa Sans"/>
               </a:rPr>
-              <a:t>Social</a:t>
+              <a:t>General inquiries</a:t>
             </a:r>
             <a:endParaRPr b="1" sz="1800">
               <a:solidFill>
@@ -14601,162 +14894,6 @@
               <a:buNone/>
             </a:pPr>
             <a:r>
-              <a:rPr lang="en">
-                <a:solidFill>
-                  <a:srgbClr val="FFFFFF"/>
-                </a:solidFill>
-                <a:latin typeface="Source Sans Pro"/>
-                <a:ea typeface="Source Sans Pro"/>
-                <a:cs typeface="Source Sans Pro"/>
-                <a:sym typeface="Source Sans Pro"/>
-              </a:rPr>
-              <a:t>Blog: </a:t>
-            </a:r>
-            <a:r>
-              <a:rPr lang="en" u="sng">
-                <a:solidFill>
-                  <a:schemeClr val="hlink"/>
-                </a:solidFill>
-                <a:latin typeface="Source Sans Pro"/>
-                <a:ea typeface="Source Sans Pro"/>
-                <a:cs typeface="Source Sans Pro"/>
-                <a:sym typeface="Source Sans Pro"/>
-                <a:hlinkClick r:id="rId6"/>
-              </a:rPr>
-              <a:t>https://www.theqrl.org/blog/</a:t>
-            </a:r>
-            <a:endParaRPr>
-              <a:solidFill>
-                <a:srgbClr val="FFFFFF"/>
-              </a:solidFill>
-              <a:latin typeface="Source Sans Pro"/>
-              <a:ea typeface="Source Sans Pro"/>
-              <a:cs typeface="Source Sans Pro"/>
-              <a:sym typeface="Source Sans Pro"/>
-            </a:endParaRPr>
-          </a:p>
-          <a:p>
-            <a:pPr indent="0" lvl="0" marL="0" rtl="0" algn="l">
-              <a:lnSpc>
-                <a:spcPct val="105000"/>
-              </a:lnSpc>
-              <a:spcBef>
-                <a:spcPts val="800"/>
-              </a:spcBef>
-              <a:spcAft>
-                <a:spcPts val="0"/>
-              </a:spcAft>
-              <a:buNone/>
-            </a:pPr>
-            <a:r>
-              <a:rPr lang="en">
-                <a:solidFill>
-                  <a:srgbClr val="FFFFFF"/>
-                </a:solidFill>
-                <a:latin typeface="Source Sans Pro"/>
-                <a:ea typeface="Source Sans Pro"/>
-                <a:cs typeface="Source Sans Pro"/>
-                <a:sym typeface="Source Sans Pro"/>
-              </a:rPr>
-              <a:t>Discord: </a:t>
-            </a:r>
-            <a:r>
-              <a:rPr lang="en" u="sng">
-                <a:solidFill>
-                  <a:schemeClr val="hlink"/>
-                </a:solidFill>
-                <a:latin typeface="Source Sans Pro"/>
-                <a:ea typeface="Source Sans Pro"/>
-                <a:cs typeface="Source Sans Pro"/>
-                <a:sym typeface="Source Sans Pro"/>
-                <a:hlinkClick r:id="rId7"/>
-              </a:rPr>
-              <a:t>https://www.discord.gg/qrl</a:t>
-            </a:r>
-            <a:endParaRPr>
-              <a:solidFill>
-                <a:srgbClr val="FFFFFF"/>
-              </a:solidFill>
-              <a:latin typeface="Source Sans Pro"/>
-              <a:ea typeface="Source Sans Pro"/>
-              <a:cs typeface="Source Sans Pro"/>
-              <a:sym typeface="Source Sans Pro"/>
-            </a:endParaRPr>
-          </a:p>
-          <a:p>
-            <a:pPr indent="0" lvl="0" marL="0" rtl="0" algn="l">
-              <a:lnSpc>
-                <a:spcPct val="105000"/>
-              </a:lnSpc>
-              <a:spcBef>
-                <a:spcPts val="800"/>
-              </a:spcBef>
-              <a:spcAft>
-                <a:spcPts val="0"/>
-              </a:spcAft>
-              <a:buNone/>
-            </a:pPr>
-            <a:r>
-              <a:rPr lang="en">
-                <a:solidFill>
-                  <a:srgbClr val="FFFFFF"/>
-                </a:solidFill>
-                <a:latin typeface="Source Sans Pro"/>
-                <a:ea typeface="Source Sans Pro"/>
-                <a:cs typeface="Source Sans Pro"/>
-                <a:sym typeface="Source Sans Pro"/>
-              </a:rPr>
-              <a:t>Reddit: </a:t>
-            </a:r>
-            <a:r>
-              <a:rPr lang="en" u="sng">
-                <a:solidFill>
-                  <a:schemeClr val="hlink"/>
-                </a:solidFill>
-                <a:latin typeface="Source Sans Pro"/>
-                <a:ea typeface="Source Sans Pro"/>
-                <a:cs typeface="Source Sans Pro"/>
-                <a:sym typeface="Source Sans Pro"/>
-                <a:hlinkClick r:id="rId8"/>
-              </a:rPr>
-              <a:t>https://www.reddit.com/r/qrl</a:t>
-            </a:r>
-            <a:endParaRPr>
-              <a:solidFill>
-                <a:srgbClr val="FFFFFF"/>
-              </a:solidFill>
-              <a:latin typeface="Source Sans Pro"/>
-              <a:ea typeface="Source Sans Pro"/>
-              <a:cs typeface="Source Sans Pro"/>
-              <a:sym typeface="Source Sans Pro"/>
-            </a:endParaRPr>
-          </a:p>
-          <a:p>
-            <a:pPr indent="0" lvl="0" marL="0" rtl="0" algn="l">
-              <a:lnSpc>
-                <a:spcPct val="105000"/>
-              </a:lnSpc>
-              <a:spcBef>
-                <a:spcPts val="800"/>
-              </a:spcBef>
-              <a:spcAft>
-                <a:spcPts val="0"/>
-              </a:spcAft>
-              <a:buNone/>
-            </a:pPr>
-            <a:r>
-              <a:rPr lang="en">
-                <a:solidFill>
-                  <a:srgbClr val="FFFFFF"/>
-                </a:solidFill>
-                <a:latin typeface="Source Sans Pro"/>
-                <a:ea typeface="Source Sans Pro"/>
-                <a:cs typeface="Source Sans Pro"/>
-                <a:sym typeface="Source Sans Pro"/>
-              </a:rPr>
-              <a:t>Twitter: </a:t>
-            </a:r>
-            <a:r>
               <a:rPr lang="en" u="sng">
                 <a:solidFill>
                   <a:schemeClr val="hlink"/>
@@ -14767,16 +14904,69 @@
                 <a:sym typeface="Source Sans Pro"/>
                 <a:hlinkClick r:id="rId9"/>
               </a:rPr>
-              <a:t>https://twitter.com/QRLedger</a:t>
+              <a:t>info@theqrl.org</a:t>
             </a:r>
-            <a:endParaRPr>
+            <a:endParaRPr/>
+          </a:p>
+        </p:txBody>
+      </p:sp>
+      <p:sp>
+        <p:nvSpPr>
+          <p:cNvPr id="155" name="Google Shape;155;p20"/>
+          <p:cNvSpPr txBox="1"/>
+          <p:nvPr/>
+        </p:nvSpPr>
+        <p:spPr>
+          <a:xfrm>
+            <a:off x="457200" y="3264395"/>
+            <a:ext cx="3886200" cy="1516200"/>
+          </a:xfrm>
+          <a:prstGeom prst="rect">
+            <a:avLst/>
+          </a:prstGeom>
+          <a:noFill/>
+          <a:ln>
+            <a:noFill/>
+          </a:ln>
+        </p:spPr>
+        <p:txBody>
+          <a:bodyPr anchorCtr="0" anchor="t" bIns="91425" lIns="91425" spcFirstLastPara="1" rIns="91425" wrap="square" tIns="91425">
+            <a:spAutoFit/>
+          </a:bodyPr>
+          <a:lstStyle/>
+          <a:p>
+            <a:pPr indent="0" lvl="0" marL="0" rtl="0" algn="l">
+              <a:lnSpc>
+                <a:spcPct val="105000"/>
+              </a:lnSpc>
+              <a:spcBef>
+                <a:spcPts val="800"/>
+              </a:spcBef>
+              <a:spcAft>
+                <a:spcPts val="0"/>
+              </a:spcAft>
+              <a:buNone/>
+            </a:pPr>
+            <a:r>
+              <a:rPr b="1" lang="en" sz="1800">
+                <a:solidFill>
+                  <a:schemeClr val="accent1"/>
+                </a:solidFill>
+                <a:latin typeface="Ropa Sans"/>
+                <a:ea typeface="Ropa Sans"/>
+                <a:cs typeface="Ropa Sans"/>
+                <a:sym typeface="Ropa Sans"/>
+              </a:rPr>
+              <a:t>Website</a:t>
+            </a:r>
+            <a:endParaRPr b="1" sz="1800">
               <a:solidFill>
-                <a:srgbClr val="FFFFFF"/>
+                <a:schemeClr val="accent1"/>
               </a:solidFill>
-              <a:latin typeface="Source Sans Pro"/>
-              <a:ea typeface="Source Sans Pro"/>
-              <a:cs typeface="Source Sans Pro"/>
-              <a:sym typeface="Source Sans Pro"/>
+              <a:latin typeface="Ropa Sans"/>
+              <a:ea typeface="Ropa Sans"/>
+              <a:cs typeface="Ropa Sans"/>
+              <a:sym typeface="Ropa Sans"/>
             </a:endParaRPr>
           </a:p>
           <a:p>
@@ -14792,18 +14982,6 @@
               </a:spcAft>
               <a:buNone/>
             </a:pPr>
-            <a:r>
-              <a:rPr lang="en">
-                <a:solidFill>
-                  <a:srgbClr val="FFFFFF"/>
-                </a:solidFill>
-                <a:latin typeface="Source Sans Pro"/>
-                <a:ea typeface="Source Sans Pro"/>
-                <a:cs typeface="Source Sans Pro"/>
-                <a:sym typeface="Source Sans Pro"/>
-              </a:rPr>
-              <a:t>Youtube: </a:t>
-            </a:r>
             <a:r>
               <a:rPr lang="en" u="sng">
                 <a:solidFill>
@@ -14815,16 +14993,466 @@
                 <a:sym typeface="Source Sans Pro"/>
                 <a:hlinkClick r:id="rId10"/>
               </a:rPr>
-              <a:t>https://youtube.com/c/QRLedger</a:t>
+              <a:t>https://www.theqrl.org/</a:t>
             </a:r>
-            <a:endParaRPr>
+            <a:endParaRPr b="1" sz="1800">
               <a:solidFill>
-                <a:srgbClr val="FFFFFF"/>
+                <a:schemeClr val="accent1"/>
               </a:solidFill>
-              <a:latin typeface="Source Sans Pro"/>
-              <a:ea typeface="Source Sans Pro"/>
-              <a:cs typeface="Source Sans Pro"/>
-              <a:sym typeface="Source Sans Pro"/>
+              <a:latin typeface="Ropa Sans"/>
+              <a:ea typeface="Ropa Sans"/>
+              <a:cs typeface="Ropa Sans"/>
+              <a:sym typeface="Ropa Sans"/>
+            </a:endParaRPr>
+          </a:p>
+          <a:p>
+            <a:pPr indent="0" lvl="0" marL="0" rtl="0" algn="l">
+              <a:lnSpc>
+                <a:spcPct val="105000"/>
+              </a:lnSpc>
+              <a:spcBef>
+                <a:spcPts val="800"/>
+              </a:spcBef>
+              <a:spcAft>
+                <a:spcPts val="0"/>
+              </a:spcAft>
+              <a:buNone/>
+            </a:pPr>
+            <a:r>
+              <a:rPr b="1" lang="en" sz="1800">
+                <a:solidFill>
+                  <a:schemeClr val="accent1"/>
+                </a:solidFill>
+                <a:latin typeface="Ropa Sans"/>
+                <a:ea typeface="Ropa Sans"/>
+                <a:cs typeface="Ropa Sans"/>
+                <a:sym typeface="Ropa Sans"/>
+              </a:rPr>
+              <a:t>Markets</a:t>
+            </a:r>
+            <a:endParaRPr b="1" sz="1800">
+              <a:solidFill>
+                <a:schemeClr val="accent1"/>
+              </a:solidFill>
+              <a:latin typeface="Ropa Sans"/>
+              <a:ea typeface="Ropa Sans"/>
+              <a:cs typeface="Ropa Sans"/>
+              <a:sym typeface="Ropa Sans"/>
+            </a:endParaRPr>
+          </a:p>
+          <a:p>
+            <a:pPr indent="0" lvl="0" marL="0" rtl="0" algn="l">
+              <a:lnSpc>
+                <a:spcPct val="105000"/>
+              </a:lnSpc>
+              <a:spcBef>
+                <a:spcPts val="800"/>
+              </a:spcBef>
+              <a:spcAft>
+                <a:spcPts val="0"/>
+              </a:spcAft>
+              <a:buNone/>
+            </a:pPr>
+            <a:r>
+              <a:rPr lang="en" u="sng">
+                <a:solidFill>
+                  <a:schemeClr val="hlink"/>
+                </a:solidFill>
+                <a:latin typeface="Source Sans Pro"/>
+                <a:ea typeface="Source Sans Pro"/>
+                <a:cs typeface="Source Sans Pro"/>
+                <a:sym typeface="Source Sans Pro"/>
+                <a:hlinkClick r:id="rId11"/>
+              </a:rPr>
+              <a:t>https://www.theqrl.org/markets/</a:t>
+            </a:r>
+            <a:endParaRPr/>
+          </a:p>
+        </p:txBody>
+      </p:sp>
+    </p:spTree>
+  </p:cSld>
+  <p:clrMapOvr>
+    <a:masterClrMapping/>
+  </p:clrMapOvr>
+</p:sld>
+</file>
+
+<file path=ppt/slides/slide9.xml><?xml version="1.0" encoding="utf-8"?>
+<p:sld xmlns:a="http://schemas.openxmlformats.org/drawingml/2006/main" xmlns:r="http://schemas.openxmlformats.org/officeDocument/2006/relationships" xmlns:mc="http://schemas.openxmlformats.org/markup-compatibility/2006" xmlns:mv="urn:schemas-microsoft-com:mac:vml" xmlns:p="http://schemas.openxmlformats.org/presentationml/2006/main" xmlns:c="http://schemas.openxmlformats.org/drawingml/2006/chart" xmlns:dgm="http://schemas.openxmlformats.org/drawingml/2006/diagram" xmlns:o="urn:schemas-microsoft-com:office:office" xmlns:v="urn:schemas-microsoft-com:vml" xmlns:pvml="urn:schemas-microsoft-com:office:powerpoint" xmlns:com="http://schemas.openxmlformats.org/drawingml/2006/compatibility" xmlns:p14="http://schemas.microsoft.com/office/powerpoint/2010/main" xmlns:p15="http://schemas.microsoft.com/office/powerpoint/2012/main" xmlns:ahyp="http://schemas.microsoft.com/office/drawing/2018/hyperlinkcolor">
+  <p:cSld>
+    <p:spTree>
+      <p:nvGrpSpPr>
+        <p:cNvPr id="160" name="Shape 160"/>
+        <p:cNvGrpSpPr/>
+        <p:nvPr/>
+      </p:nvGrpSpPr>
+      <p:grpSpPr>
+        <a:xfrm>
+          <a:off x="0" y="0"/>
+          <a:ext cx="0" cy="0"/>
+          <a:chOff x="0" y="0"/>
+          <a:chExt cx="0" cy="0"/>
+        </a:xfrm>
+      </p:grpSpPr>
+      <p:sp>
+        <p:nvSpPr>
+          <p:cNvPr id="161" name="Google Shape;161;p21"/>
+          <p:cNvSpPr txBox="1"/>
+          <p:nvPr>
+            <p:ph type="title"/>
+          </p:nvPr>
+        </p:nvSpPr>
+        <p:spPr>
+          <a:xfrm>
+            <a:off x="457200" y="228600"/>
+            <a:ext cx="3886200" cy="457200"/>
+          </a:xfrm>
+          <a:prstGeom prst="rect">
+            <a:avLst/>
+          </a:prstGeom>
+          <a:noFill/>
+          <a:ln>
+            <a:noFill/>
+          </a:ln>
+        </p:spPr>
+        <p:txBody>
+          <a:bodyPr anchorCtr="0" anchor="ctr" bIns="34275" lIns="68575" spcFirstLastPara="1" rIns="68575" wrap="square" tIns="34275">
+            <a:spAutoFit/>
+          </a:bodyPr>
+          <a:lstStyle/>
+          <a:p>
+            <a:pPr indent="0" lvl="0" marL="0" rtl="0" algn="l">
+              <a:lnSpc>
+                <a:spcPct val="90000"/>
+              </a:lnSpc>
+              <a:spcBef>
+                <a:spcPts val="0"/>
+              </a:spcBef>
+              <a:spcAft>
+                <a:spcPts val="0"/>
+              </a:spcAft>
+              <a:buClr>
+                <a:schemeClr val="accent1"/>
+              </a:buClr>
+              <a:buSzPts val="3300"/>
+              <a:buFont typeface="Arial"/>
+              <a:buNone/>
+            </a:pPr>
+            <a:r>
+              <a:rPr lang="en" sz="2800"/>
+              <a:t>REFERENCES AND LINKS</a:t>
+            </a:r>
+            <a:endParaRPr b="1" sz="2800">
+              <a:latin typeface="Ropa Sans"/>
+              <a:ea typeface="Ropa Sans"/>
+              <a:cs typeface="Ropa Sans"/>
+              <a:sym typeface="Ropa Sans"/>
+            </a:endParaRPr>
+          </a:p>
+        </p:txBody>
+      </p:sp>
+      <p:sp>
+        <p:nvSpPr>
+          <p:cNvPr id="162" name="Google Shape;162;p21"/>
+          <p:cNvSpPr txBox="1"/>
+          <p:nvPr>
+            <p:ph idx="1" type="body"/>
+          </p:nvPr>
+        </p:nvSpPr>
+        <p:spPr>
+          <a:xfrm>
+            <a:off x="474275" y="727250"/>
+            <a:ext cx="8284200" cy="3510600"/>
+          </a:xfrm>
+          <a:prstGeom prst="rect">
+            <a:avLst/>
+          </a:prstGeom>
+          <a:noFill/>
+          <a:ln>
+            <a:noFill/>
+          </a:ln>
+        </p:spPr>
+        <p:txBody>
+          <a:bodyPr anchorCtr="0" anchor="t" bIns="34275" lIns="68575" spcFirstLastPara="1" rIns="68575" wrap="square" tIns="34275">
+            <a:spAutoFit/>
+          </a:bodyPr>
+          <a:lstStyle/>
+          <a:p>
+            <a:pPr indent="0" lvl="0" marL="0" rtl="0" algn="l">
+              <a:lnSpc>
+                <a:spcPct val="105000"/>
+              </a:lnSpc>
+              <a:spcBef>
+                <a:spcPts val="800"/>
+              </a:spcBef>
+              <a:spcAft>
+                <a:spcPts val="0"/>
+              </a:spcAft>
+              <a:buNone/>
+            </a:pPr>
+            <a:r>
+              <a:rPr lang="en" sz="1400"/>
+              <a:t>COMMERCIAL ENTITIES:</a:t>
+            </a:r>
+            <a:endParaRPr sz="1400"/>
+          </a:p>
+          <a:p>
+            <a:pPr indent="0" lvl="0" marL="0" rtl="0" algn="l">
+              <a:lnSpc>
+                <a:spcPct val="105000"/>
+              </a:lnSpc>
+              <a:spcBef>
+                <a:spcPts val="800"/>
+              </a:spcBef>
+              <a:spcAft>
+                <a:spcPts val="0"/>
+              </a:spcAft>
+              <a:buNone/>
+            </a:pPr>
+            <a:r>
+              <a:rPr lang="en" sz="1400"/>
+              <a:t>IBM		</a:t>
+            </a:r>
+            <a:r>
+              <a:rPr lang="en" sz="1400" u="sng">
+                <a:solidFill>
+                  <a:schemeClr val="hlink"/>
+                </a:solidFill>
+                <a:hlinkClick r:id="rId3"/>
+              </a:rPr>
+              <a:t>https://www.ibm.com/quantum-computing/</a:t>
+            </a:r>
+            <a:endParaRPr sz="1400"/>
+          </a:p>
+          <a:p>
+            <a:pPr indent="0" lvl="0" marL="0" rtl="0" algn="l">
+              <a:lnSpc>
+                <a:spcPct val="105000"/>
+              </a:lnSpc>
+              <a:spcBef>
+                <a:spcPts val="800"/>
+              </a:spcBef>
+              <a:spcAft>
+                <a:spcPts val="0"/>
+              </a:spcAft>
+              <a:buNone/>
+            </a:pPr>
+            <a:r>
+              <a:rPr lang="en" sz="1400"/>
+              <a:t>Google	</a:t>
+            </a:r>
+            <a:r>
+              <a:rPr lang="en" sz="1400" u="sng">
+                <a:solidFill>
+                  <a:schemeClr val="hlink"/>
+                </a:solidFill>
+                <a:hlinkClick r:id="rId4"/>
+              </a:rPr>
+              <a:t>https://quantumai.google/</a:t>
+            </a:r>
+            <a:endParaRPr sz="1400"/>
+          </a:p>
+          <a:p>
+            <a:pPr indent="0" lvl="0" marL="0" rtl="0" algn="l">
+              <a:lnSpc>
+                <a:spcPct val="105000"/>
+              </a:lnSpc>
+              <a:spcBef>
+                <a:spcPts val="800"/>
+              </a:spcBef>
+              <a:spcAft>
+                <a:spcPts val="0"/>
+              </a:spcAft>
+              <a:buNone/>
+            </a:pPr>
+            <a:r>
+              <a:rPr lang="en" sz="1400"/>
+              <a:t>Microsoft	</a:t>
+            </a:r>
+            <a:r>
+              <a:rPr lang="en" sz="1400" u="sng">
+                <a:solidFill>
+                  <a:schemeClr val="hlink"/>
+                </a:solidFill>
+                <a:hlinkClick r:id="rId5"/>
+              </a:rPr>
+              <a:t>https://www.microsoft.com/en-us/research/research-area/quantum-computing</a:t>
+            </a:r>
+            <a:endParaRPr sz="1400"/>
+          </a:p>
+          <a:p>
+            <a:pPr indent="0" lvl="0" marL="0" rtl="0" algn="l">
+              <a:lnSpc>
+                <a:spcPct val="105000"/>
+              </a:lnSpc>
+              <a:spcBef>
+                <a:spcPts val="800"/>
+              </a:spcBef>
+              <a:spcAft>
+                <a:spcPts val="0"/>
+              </a:spcAft>
+              <a:buNone/>
+            </a:pPr>
+            <a:r>
+              <a:t/>
+            </a:r>
+            <a:endParaRPr sz="1400"/>
+          </a:p>
+          <a:p>
+            <a:pPr indent="0" lvl="0" marL="0" rtl="0" algn="l">
+              <a:lnSpc>
+                <a:spcPct val="105000"/>
+              </a:lnSpc>
+              <a:spcBef>
+                <a:spcPts val="800"/>
+              </a:spcBef>
+              <a:spcAft>
+                <a:spcPts val="0"/>
+              </a:spcAft>
+              <a:buNone/>
+            </a:pPr>
+            <a:r>
+              <a:rPr lang="en" sz="1400"/>
+              <a:t>GOVERNMENT</a:t>
+            </a:r>
+            <a:r>
+              <a:rPr lang="en" sz="1400"/>
+              <a:t> ENTITIES:</a:t>
+            </a:r>
+            <a:endParaRPr sz="1400"/>
+          </a:p>
+          <a:p>
+            <a:pPr indent="0" lvl="0" marL="0" rtl="0" algn="l">
+              <a:lnSpc>
+                <a:spcPct val="105000"/>
+              </a:lnSpc>
+              <a:spcBef>
+                <a:spcPts val="800"/>
+              </a:spcBef>
+              <a:spcAft>
+                <a:spcPts val="0"/>
+              </a:spcAft>
+              <a:buNone/>
+            </a:pPr>
+            <a:r>
+              <a:rPr lang="en" sz="1400"/>
+              <a:t>Intel		</a:t>
+            </a:r>
+            <a:r>
+              <a:rPr lang="en" sz="1400" u="sng">
+                <a:solidFill>
+                  <a:schemeClr val="hlink"/>
+                </a:solidFill>
+                <a:hlinkClick r:id="rId6"/>
+              </a:rPr>
+              <a:t>https://www.intel.com/content/www/us/en/research/quantum-computing.html</a:t>
+            </a:r>
+            <a:endParaRPr sz="1400"/>
+          </a:p>
+          <a:p>
+            <a:pPr indent="0" lvl="0" marL="0" rtl="0" algn="l">
+              <a:lnSpc>
+                <a:spcPct val="105000"/>
+              </a:lnSpc>
+              <a:spcBef>
+                <a:spcPts val="800"/>
+              </a:spcBef>
+              <a:spcAft>
+                <a:spcPts val="0"/>
+              </a:spcAft>
+              <a:buNone/>
+            </a:pPr>
+            <a:r>
+              <a:rPr lang="en" sz="1400"/>
+              <a:t>NIST		</a:t>
+            </a:r>
+            <a:r>
+              <a:rPr lang="en" sz="1400" u="sng">
+                <a:solidFill>
+                  <a:schemeClr val="hlink"/>
+                </a:solidFill>
+                <a:hlinkClick r:id="rId7"/>
+              </a:rPr>
+              <a:t>https://csrc.nist.gov/news/2016/public-key-post-quantum-cryptographic-algorithms</a:t>
+            </a:r>
+            <a:endParaRPr sz="1400"/>
+          </a:p>
+          <a:p>
+            <a:pPr indent="0" lvl="0" marL="0" rtl="0" algn="l">
+              <a:lnSpc>
+                <a:spcPct val="105000"/>
+              </a:lnSpc>
+              <a:spcBef>
+                <a:spcPts val="800"/>
+              </a:spcBef>
+              <a:spcAft>
+                <a:spcPts val="0"/>
+              </a:spcAft>
+              <a:buNone/>
+            </a:pPr>
+            <a:r>
+              <a:rPr lang="en" sz="1400"/>
+              <a:t>MEDIA:</a:t>
+            </a:r>
+            <a:endParaRPr sz="1400"/>
+          </a:p>
+          <a:p>
+            <a:pPr indent="0" lvl="0" marL="0" rtl="0" algn="l">
+              <a:lnSpc>
+                <a:spcPct val="105000"/>
+              </a:lnSpc>
+              <a:spcBef>
+                <a:spcPts val="800"/>
+              </a:spcBef>
+              <a:spcAft>
+                <a:spcPts val="0"/>
+              </a:spcAft>
+              <a:buNone/>
+            </a:pPr>
+            <a:r>
+              <a:rPr b="1" lang="en" sz="1200">
+                <a:solidFill>
+                  <a:schemeClr val="accent1"/>
+                </a:solidFill>
+              </a:rPr>
+              <a:t>“No! You can't just Quantum Soft fork Bitcoin! Or can you ???”	</a:t>
+            </a:r>
+            <a:r>
+              <a:rPr b="1" lang="en" sz="1200" u="sng">
+                <a:solidFill>
+                  <a:schemeClr val="hlink"/>
+                </a:solidFill>
+                <a:hlinkClick r:id="rId8"/>
+              </a:rPr>
+              <a:t>https://www.youtube.com/watch?v=cbP2ejgSxcA</a:t>
+            </a:r>
+            <a:endParaRPr b="1" sz="1200">
+              <a:solidFill>
+                <a:schemeClr val="accent1"/>
+              </a:solidFill>
+            </a:endParaRPr>
+          </a:p>
+          <a:p>
+            <a:pPr indent="0" lvl="0" marL="0" rtl="0" algn="l">
+              <a:lnSpc>
+                <a:spcPct val="105000"/>
+              </a:lnSpc>
+              <a:spcBef>
+                <a:spcPts val="800"/>
+              </a:spcBef>
+              <a:spcAft>
+                <a:spcPts val="0"/>
+              </a:spcAft>
+              <a:buNone/>
+            </a:pPr>
+            <a:r>
+              <a:t/>
+            </a:r>
+            <a:endParaRPr b="1" sz="1200">
+              <a:solidFill>
+                <a:schemeClr val="accent1"/>
+              </a:solidFill>
             </a:endParaRPr>
           </a:p>
         </p:txBody>
@@ -14838,6 +15466,285 @@
 </file>
 
 <file path=ppt/theme/theme1.xml><?xml version="1.0" encoding="utf-8"?>
+<a:theme xmlns:a="http://schemas.openxmlformats.org/drawingml/2006/main" xmlns:r="http://schemas.openxmlformats.org/officeDocument/2006/relationships" name="QRL Theme">
+  <a:themeElements>
+    <a:clrScheme name="QRL">
+      <a:dk1>
+        <a:srgbClr val="0A181D"/>
+      </a:dk1>
+      <a:lt1>
+        <a:srgbClr val="EAEFF5"/>
+      </a:lt1>
+      <a:dk2>
+        <a:srgbClr val="3B464A"/>
+      </a:dk2>
+      <a:lt2>
+        <a:srgbClr val="E7E6E6"/>
+      </a:lt2>
+      <a:accent1>
+        <a:srgbClr val="FEA728"/>
+      </a:accent1>
+      <a:accent2>
+        <a:srgbClr val="47ABFA"/>
+      </a:accent2>
+      <a:accent3>
+        <a:srgbClr val="FEB954"/>
+      </a:accent3>
+      <a:accent4>
+        <a:srgbClr val="6EBEFE"/>
+      </a:accent4>
+      <a:accent5>
+        <a:srgbClr val="FFC97E"/>
+      </a:accent5>
+      <a:accent6>
+        <a:srgbClr val="91CEFF"/>
+      </a:accent6>
+      <a:hlink>
+        <a:srgbClr val="45A1ED"/>
+      </a:hlink>
+      <a:folHlink>
+        <a:srgbClr val="6EBEFE"/>
+      </a:folHlink>
+    </a:clrScheme>
+    <a:fontScheme name="Office">
+      <a:majorFont>
+        <a:latin typeface="Arial"/>
+        <a:ea typeface=""/>
+        <a:cs typeface=""/>
+        <a:font script="Jpan" typeface="ＭＳ Ｐゴシック"/>
+        <a:font script="Hang" typeface="맑은 고딕"/>
+        <a:font script="Hans" typeface="宋体"/>
+        <a:font script="Hant" typeface="新細明體"/>
+        <a:font script="Arab" typeface="Times New Roman"/>
+        <a:font script="Hebr" typeface="Times New Roman"/>
+        <a:font script="Thai" typeface="Angsana New"/>
+        <a:font script="Ethi" typeface="Nyala"/>
+        <a:font script="Beng" typeface="Vrinda"/>
+        <a:font script="Gujr" typeface="Shruti"/>
+        <a:font script="Khmr" typeface="MoolBoran"/>
+        <a:font script="Knda" typeface="Tunga"/>
+        <a:font script="Guru" typeface="Raavi"/>
+        <a:font script="Cans" typeface="Euphemia"/>
+        <a:font script="Cher" typeface="Plantagenet Cherokee"/>
+        <a:font script="Yiii" typeface="Microsoft Yi Baiti"/>
+        <a:font script="Tibt" typeface="Microsoft Himalaya"/>
+        <a:font script="Thaa" typeface="MV Boli"/>
+        <a:font script="Deva" typeface="Mangal"/>
+        <a:font script="Telu" typeface="Gautami"/>
+        <a:font script="Taml" typeface="Latha"/>
+        <a:font script="Syrc" typeface="Estrangelo Edessa"/>
+        <a:font script="Orya" typeface="Kalinga"/>
+        <a:font script="Mlym" typeface="Kartika"/>
+        <a:font script="Laoo" typeface="DokChampa"/>
+        <a:font script="Sinh" typeface="Iskoola Pota"/>
+        <a:font script="Mong" typeface="Mongolian Baiti"/>
+        <a:font script="Viet" typeface="Times New Roman"/>
+        <a:font script="Uigh" typeface="Microsoft Uighur"/>
+        <a:font script="Geor" typeface="Sylfaen"/>
+      </a:majorFont>
+      <a:minorFont>
+        <a:latin typeface="Arial"/>
+        <a:ea typeface=""/>
+        <a:cs typeface=""/>
+        <a:font script="Jpan" typeface="ＭＳ Ｐゴシック"/>
+        <a:font script="Hang" typeface="맑은 고딕"/>
+        <a:font script="Hans" typeface="宋体"/>
+        <a:font script="Hant" typeface="新細明體"/>
+        <a:font script="Arab" typeface="Arial"/>
+        <a:font script="Hebr" typeface="Arial"/>
+        <a:font script="Thai" typeface="Cordia New"/>
+        <a:font script="Ethi" typeface="Nyala"/>
+        <a:font script="Beng" typeface="Vrinda"/>
+        <a:font script="Gujr" typeface="Shruti"/>
+        <a:font script="Khmr" typeface="DaunPenh"/>
+        <a:font script="Knda" typeface="Tunga"/>
+        <a:font script="Guru" typeface="Raavi"/>
+        <a:font script="Cans" typeface="Euphemia"/>
+        <a:font script="Cher" typeface="Plantagenet Cherokee"/>
+        <a:font script="Yiii" typeface="Microsoft Yi Baiti"/>
+        <a:font script="Tibt" typeface="Microsoft Himalaya"/>
+        <a:font script="Thaa" typeface="MV Boli"/>
+        <a:font script="Deva" typeface="Mangal"/>
+        <a:font script="Telu" typeface="Gautami"/>
+        <a:font script="Taml" typeface="Latha"/>
+        <a:font script="Syrc" typeface="Estrangelo Edessa"/>
+        <a:font script="Orya" typeface="Kalinga"/>
+        <a:font script="Mlym" typeface="Kartika"/>
+        <a:font script="Laoo" typeface="DokChampa"/>
+        <a:font script="Sinh" typeface="Iskoola Pota"/>
+        <a:font script="Mong" typeface="Mongolian Baiti"/>
+        <a:font script="Viet" typeface="Arial"/>
+        <a:font script="Uigh" typeface="Microsoft Uighur"/>
+        <a:font script="Geor" typeface="Sylfaen"/>
+      </a:minorFont>
+    </a:fontScheme>
+    <a:fmtScheme name="Office">
+      <a:fillStyleLst>
+        <a:solidFill>
+          <a:schemeClr val="phClr"/>
+        </a:solidFill>
+        <a:gradFill rotWithShape="1">
+          <a:gsLst>
+            <a:gs pos="0">
+              <a:schemeClr val="phClr">
+                <a:tint val="50000"/>
+                <a:satMod val="300000"/>
+              </a:schemeClr>
+            </a:gs>
+            <a:gs pos="35000">
+              <a:schemeClr val="phClr">
+                <a:tint val="37000"/>
+                <a:satMod val="300000"/>
+              </a:schemeClr>
+            </a:gs>
+            <a:gs pos="100000">
+              <a:schemeClr val="phClr">
+                <a:tint val="15000"/>
+                <a:satMod val="350000"/>
+              </a:schemeClr>
+            </a:gs>
+          </a:gsLst>
+          <a:lin ang="16200000" scaled="1"/>
+        </a:gradFill>
+        <a:gradFill rotWithShape="1">
+          <a:gsLst>
+            <a:gs pos="0">
+              <a:schemeClr val="phClr">
+                <a:tint val="100000"/>
+                <a:shade val="100000"/>
+                <a:satMod val="130000"/>
+              </a:schemeClr>
+            </a:gs>
+            <a:gs pos="100000">
+              <a:schemeClr val="phClr">
+                <a:tint val="50000"/>
+                <a:shade val="100000"/>
+                <a:satMod val="350000"/>
+              </a:schemeClr>
+            </a:gs>
+          </a:gsLst>
+          <a:lin ang="16200000" scaled="0"/>
+        </a:gradFill>
+      </a:fillStyleLst>
+      <a:lnStyleLst>
+        <a:ln w="9525" cap="flat" cmpd="sng" algn="ctr">
+          <a:solidFill>
+            <a:schemeClr val="phClr">
+              <a:shade val="95000"/>
+              <a:satMod val="105000"/>
+            </a:schemeClr>
+          </a:solidFill>
+          <a:prstDash val="solid"/>
+        </a:ln>
+        <a:ln w="25400" cap="flat" cmpd="sng" algn="ctr">
+          <a:solidFill>
+            <a:schemeClr val="phClr"/>
+          </a:solidFill>
+          <a:prstDash val="solid"/>
+        </a:ln>
+        <a:ln w="38100" cap="flat" cmpd="sng" algn="ctr">
+          <a:solidFill>
+            <a:schemeClr val="phClr"/>
+          </a:solidFill>
+          <a:prstDash val="solid"/>
+        </a:ln>
+      </a:lnStyleLst>
+      <a:effectStyleLst>
+        <a:effectStyle>
+          <a:effectLst>
+            <a:outerShdw blurRad="40000" dist="20000" dir="5400000" rotWithShape="0">
+              <a:srgbClr val="000000">
+                <a:alpha val="38000"/>
+              </a:srgbClr>
+            </a:outerShdw>
+          </a:effectLst>
+        </a:effectStyle>
+        <a:effectStyle>
+          <a:effectLst>
+            <a:outerShdw blurRad="40000" dist="23000" dir="5400000" rotWithShape="0">
+              <a:srgbClr val="000000">
+                <a:alpha val="35000"/>
+              </a:srgbClr>
+            </a:outerShdw>
+          </a:effectLst>
+        </a:effectStyle>
+        <a:effectStyle>
+          <a:effectLst>
+            <a:outerShdw blurRad="40000" dist="23000" dir="5400000" rotWithShape="0">
+              <a:srgbClr val="000000">
+                <a:alpha val="35000"/>
+              </a:srgbClr>
+            </a:outerShdw>
+          </a:effectLst>
+          <a:scene3d>
+            <a:camera prst="orthographicFront">
+              <a:rot lat="0" lon="0" rev="0"/>
+            </a:camera>
+            <a:lightRig rig="threePt" dir="t">
+              <a:rot lat="0" lon="0" rev="1200000"/>
+            </a:lightRig>
+          </a:scene3d>
+          <a:sp3d>
+            <a:bevelT w="63500" h="25400"/>
+          </a:sp3d>
+        </a:effectStyle>
+      </a:effectStyleLst>
+      <a:bgFillStyleLst>
+        <a:solidFill>
+          <a:schemeClr val="phClr"/>
+        </a:solidFill>
+        <a:gradFill rotWithShape="1">
+          <a:gsLst>
+            <a:gs pos="0">
+              <a:schemeClr val="phClr">
+                <a:tint val="40000"/>
+                <a:satMod val="350000"/>
+              </a:schemeClr>
+            </a:gs>
+            <a:gs pos="40000">
+              <a:schemeClr val="phClr">
+                <a:tint val="45000"/>
+                <a:shade val="99000"/>
+                <a:satMod val="350000"/>
+              </a:schemeClr>
+            </a:gs>
+            <a:gs pos="100000">
+              <a:schemeClr val="phClr">
+                <a:shade val="20000"/>
+                <a:satMod val="255000"/>
+              </a:schemeClr>
+            </a:gs>
+          </a:gsLst>
+          <a:path path="circle">
+            <a:fillToRect l="50000" t="-80000" r="50000" b="180000"/>
+          </a:path>
+        </a:gradFill>
+        <a:gradFill rotWithShape="1">
+          <a:gsLst>
+            <a:gs pos="0">
+              <a:schemeClr val="phClr">
+                <a:tint val="80000"/>
+                <a:satMod val="300000"/>
+              </a:schemeClr>
+            </a:gs>
+            <a:gs pos="100000">
+              <a:schemeClr val="phClr">
+                <a:shade val="30000"/>
+                <a:satMod val="200000"/>
+              </a:schemeClr>
+            </a:gs>
+          </a:gsLst>
+          <a:path path="circle">
+            <a:fillToRect l="50000" t="50000" r="50000" b="50000"/>
+          </a:path>
+        </a:gradFill>
+      </a:bgFillStyleLst>
+    </a:fmtScheme>
+  </a:themeElements>
+</a:theme>
+</file>
+
+<file path=ppt/theme/theme2.xml><?xml version="1.0" encoding="utf-8"?>
 <a:theme xmlns:a="http://schemas.openxmlformats.org/drawingml/2006/main" xmlns:r="http://schemas.openxmlformats.org/officeDocument/2006/relationships">
   <a:themeElements>
     <a:clrScheme name="Default">
@@ -15114,283 +16021,4 @@
     </a:fmtScheme>
   </a:themeElements>
 </a:theme>
-</file>
-
-<file path=ppt/theme/theme2.xml><?xml version="1.0" encoding="utf-8"?>
-<a:theme xmlns:a="http://schemas.openxmlformats.org/drawingml/2006/main" xmlns:r="http://schemas.openxmlformats.org/officeDocument/2006/relationships" name="QRL Theme">
-  <a:themeElements>
-    <a:clrScheme name="QRL">
-      <a:dk1>
-        <a:srgbClr val="0A181D"/>
-      </a:dk1>
-      <a:lt1>
-        <a:srgbClr val="EAEFF5"/>
-      </a:lt1>
-      <a:dk2>
-        <a:srgbClr val="3B464A"/>
-      </a:dk2>
-      <a:lt2>
-        <a:srgbClr val="E7E6E6"/>
-      </a:lt2>
-      <a:accent1>
-        <a:srgbClr val="FEA728"/>
-      </a:accent1>
-      <a:accent2>
-        <a:srgbClr val="47ABFA"/>
-      </a:accent2>
-      <a:accent3>
-        <a:srgbClr val="FEB954"/>
-      </a:accent3>
-      <a:accent4>
-        <a:srgbClr val="6EBEFE"/>
-      </a:accent4>
-      <a:accent5>
-        <a:srgbClr val="FFC97E"/>
-      </a:accent5>
-      <a:accent6>
-        <a:srgbClr val="91CEFF"/>
-      </a:accent6>
-      <a:hlink>
-        <a:srgbClr val="45A1ED"/>
-      </a:hlink>
-      <a:folHlink>
-        <a:srgbClr val="6EBEFE"/>
-      </a:folHlink>
-    </a:clrScheme>
-    <a:fontScheme name="Office">
-      <a:majorFont>
-        <a:latin typeface="Arial"/>
-        <a:ea typeface=""/>
-        <a:cs typeface=""/>
-        <a:font script="Jpan" typeface="ＭＳ Ｐゴシック"/>
-        <a:font script="Hang" typeface="맑은 고딕"/>
-        <a:font script="Hans" typeface="宋体"/>
-        <a:font script="Hant" typeface="新細明體"/>
-        <a:font script="Arab" typeface="Times New Roman"/>
-        <a:font script="Hebr" typeface="Times New Roman"/>
-        <a:font script="Thai" typeface="Angsana New"/>
-        <a:font script="Ethi" typeface="Nyala"/>
-        <a:font script="Beng" typeface="Vrinda"/>
-        <a:font script="Gujr" typeface="Shruti"/>
-        <a:font script="Khmr" typeface="MoolBoran"/>
-        <a:font script="Knda" typeface="Tunga"/>
-        <a:font script="Guru" typeface="Raavi"/>
-        <a:font script="Cans" typeface="Euphemia"/>
-        <a:font script="Cher" typeface="Plantagenet Cherokee"/>
-        <a:font script="Yiii" typeface="Microsoft Yi Baiti"/>
-        <a:font script="Tibt" typeface="Microsoft Himalaya"/>
-        <a:font script="Thaa" typeface="MV Boli"/>
-        <a:font script="Deva" typeface="Mangal"/>
-        <a:font script="Telu" typeface="Gautami"/>
-        <a:font script="Taml" typeface="Latha"/>
-        <a:font script="Syrc" typeface="Estrangelo Edessa"/>
-        <a:font script="Orya" typeface="Kalinga"/>
-        <a:font script="Mlym" typeface="Kartika"/>
-        <a:font script="Laoo" typeface="DokChampa"/>
-        <a:font script="Sinh" typeface="Iskoola Pota"/>
-        <a:font script="Mong" typeface="Mongolian Baiti"/>
-        <a:font script="Viet" typeface="Times New Roman"/>
-        <a:font script="Uigh" typeface="Microsoft Uighur"/>
-        <a:font script="Geor" typeface="Sylfaen"/>
-      </a:majorFont>
-      <a:minorFont>
-        <a:latin typeface="Arial"/>
-        <a:ea typeface=""/>
-        <a:cs typeface=""/>
-        <a:font script="Jpan" typeface="ＭＳ Ｐゴシック"/>
-        <a:font script="Hang" typeface="맑은 고딕"/>
-        <a:font script="Hans" typeface="宋体"/>
-        <a:font script="Hant" typeface="新細明體"/>
-        <a:font script="Arab" typeface="Arial"/>
-        <a:font script="Hebr" typeface="Arial"/>
-        <a:font script="Thai" typeface="Cordia New"/>
-        <a:font script="Ethi" typeface="Nyala"/>
-        <a:font script="Beng" typeface="Vrinda"/>
-        <a:font script="Gujr" typeface="Shruti"/>
-        <a:font script="Khmr" typeface="DaunPenh"/>
-        <a:font script="Knda" typeface="Tunga"/>
-        <a:font script="Guru" typeface="Raavi"/>
-        <a:font script="Cans" typeface="Euphemia"/>
-        <a:font script="Cher" typeface="Plantagenet Cherokee"/>
-        <a:font script="Yiii" typeface="Microsoft Yi Baiti"/>
-        <a:font script="Tibt" typeface="Microsoft Himalaya"/>
-        <a:font script="Thaa" typeface="MV Boli"/>
-        <a:font script="Deva" typeface="Mangal"/>
-        <a:font script="Telu" typeface="Gautami"/>
-        <a:font script="Taml" typeface="Latha"/>
-        <a:font script="Syrc" typeface="Estrangelo Edessa"/>
-        <a:font script="Orya" typeface="Kalinga"/>
-        <a:font script="Mlym" typeface="Kartika"/>
-        <a:font script="Laoo" typeface="DokChampa"/>
-        <a:font script="Sinh" typeface="Iskoola Pota"/>
-        <a:font script="Mong" typeface="Mongolian Baiti"/>
-        <a:font script="Viet" typeface="Arial"/>
-        <a:font script="Uigh" typeface="Microsoft Uighur"/>
-        <a:font script="Geor" typeface="Sylfaen"/>
-      </a:minorFont>
-    </a:fontScheme>
-    <a:fmtScheme name="Office">
-      <a:fillStyleLst>
-        <a:solidFill>
-          <a:schemeClr val="phClr"/>
-        </a:solidFill>
-        <a:gradFill rotWithShape="1">
-          <a:gsLst>
-            <a:gs pos="0">
-              <a:schemeClr val="phClr">
-                <a:tint val="50000"/>
-                <a:satMod val="300000"/>
-              </a:schemeClr>
-            </a:gs>
-            <a:gs pos="35000">
-              <a:schemeClr val="phClr">
-                <a:tint val="37000"/>
-                <a:satMod val="300000"/>
-              </a:schemeClr>
-            </a:gs>
-            <a:gs pos="100000">
-              <a:schemeClr val="phClr">
-                <a:tint val="15000"/>
-                <a:satMod val="350000"/>
-              </a:schemeClr>
-            </a:gs>
-          </a:gsLst>
-          <a:lin ang="16200000" scaled="1"/>
-        </a:gradFill>
-        <a:gradFill rotWithShape="1">
-          <a:gsLst>
-            <a:gs pos="0">
-              <a:schemeClr val="phClr">
-                <a:tint val="100000"/>
-                <a:shade val="100000"/>
-                <a:satMod val="130000"/>
-              </a:schemeClr>
-            </a:gs>
-            <a:gs pos="100000">
-              <a:schemeClr val="phClr">
-                <a:tint val="50000"/>
-                <a:shade val="100000"/>
-                <a:satMod val="350000"/>
-              </a:schemeClr>
-            </a:gs>
-          </a:gsLst>
-          <a:lin ang="16200000" scaled="0"/>
-        </a:gradFill>
-      </a:fillStyleLst>
-      <a:lnStyleLst>
-        <a:ln w="9525" cap="flat" cmpd="sng" algn="ctr">
-          <a:solidFill>
-            <a:schemeClr val="phClr">
-              <a:shade val="95000"/>
-              <a:satMod val="105000"/>
-            </a:schemeClr>
-          </a:solidFill>
-          <a:prstDash val="solid"/>
-        </a:ln>
-        <a:ln w="25400" cap="flat" cmpd="sng" algn="ctr">
-          <a:solidFill>
-            <a:schemeClr val="phClr"/>
-          </a:solidFill>
-          <a:prstDash val="solid"/>
-        </a:ln>
-        <a:ln w="38100" cap="flat" cmpd="sng" algn="ctr">
-          <a:solidFill>
-            <a:schemeClr val="phClr"/>
-          </a:solidFill>
-          <a:prstDash val="solid"/>
-        </a:ln>
-      </a:lnStyleLst>
-      <a:effectStyleLst>
-        <a:effectStyle>
-          <a:effectLst>
-            <a:outerShdw blurRad="40000" dist="20000" dir="5400000" rotWithShape="0">
-              <a:srgbClr val="000000">
-                <a:alpha val="38000"/>
-              </a:srgbClr>
-            </a:outerShdw>
-          </a:effectLst>
-        </a:effectStyle>
-        <a:effectStyle>
-          <a:effectLst>
-            <a:outerShdw blurRad="40000" dist="23000" dir="5400000" rotWithShape="0">
-              <a:srgbClr val="000000">
-                <a:alpha val="35000"/>
-              </a:srgbClr>
-            </a:outerShdw>
-          </a:effectLst>
-        </a:effectStyle>
-        <a:effectStyle>
-          <a:effectLst>
-            <a:outerShdw blurRad="40000" dist="23000" dir="5400000" rotWithShape="0">
-              <a:srgbClr val="000000">
-                <a:alpha val="35000"/>
-              </a:srgbClr>
-            </a:outerShdw>
-          </a:effectLst>
-          <a:scene3d>
-            <a:camera prst="orthographicFront">
-              <a:rot lat="0" lon="0" rev="0"/>
-            </a:camera>
-            <a:lightRig rig="threePt" dir="t">
-              <a:rot lat="0" lon="0" rev="1200000"/>
-            </a:lightRig>
-          </a:scene3d>
-          <a:sp3d>
-            <a:bevelT w="63500" h="25400"/>
-          </a:sp3d>
-        </a:effectStyle>
-      </a:effectStyleLst>
-      <a:bgFillStyleLst>
-        <a:solidFill>
-          <a:schemeClr val="phClr"/>
-        </a:solidFill>
-        <a:gradFill rotWithShape="1">
-          <a:gsLst>
-            <a:gs pos="0">
-              <a:schemeClr val="phClr">
-                <a:tint val="40000"/>
-                <a:satMod val="350000"/>
-              </a:schemeClr>
-            </a:gs>
-            <a:gs pos="40000">
-              <a:schemeClr val="phClr">
-                <a:tint val="45000"/>
-                <a:shade val="99000"/>
-                <a:satMod val="350000"/>
-              </a:schemeClr>
-            </a:gs>
-            <a:gs pos="100000">
-              <a:schemeClr val="phClr">
-                <a:shade val="20000"/>
-                <a:satMod val="255000"/>
-              </a:schemeClr>
-            </a:gs>
-          </a:gsLst>
-          <a:path path="circle">
-            <a:fillToRect l="50000" t="-80000" r="50000" b="180000"/>
-          </a:path>
-        </a:gradFill>
-        <a:gradFill rotWithShape="1">
-          <a:gsLst>
-            <a:gs pos="0">
-              <a:schemeClr val="phClr">
-                <a:tint val="80000"/>
-                <a:satMod val="300000"/>
-              </a:schemeClr>
-            </a:gs>
-            <a:gs pos="100000">
-              <a:schemeClr val="phClr">
-                <a:shade val="30000"/>
-                <a:satMod val="200000"/>
-              </a:schemeClr>
-            </a:gs>
-          </a:gsLst>
-          <a:path path="circle">
-            <a:fillToRect l="50000" t="50000" r="50000" b="50000"/>
-          </a:path>
-        </a:gradFill>
-      </a:bgFillStyleLst>
-    </a:fmtScheme>
-  </a:themeElements>
-</a:theme>
 </file>
</xml_diff>